<commit_message>
used localhost for cart/gaze I/F's
</commit_message>
<xml_diff>
--- a/slides/2015-iit/cartesian-gaze-interfaces.pptx
+++ b/slides/2015-iit/cartesian-gaze-interfaces.pptx
@@ -5,7 +5,7 @@
     <p:sldMasterId id="2147483673" r:id="rId1"/>
   </p:sldMasterIdLst>
   <p:notesMasterIdLst>
-    <p:notesMasterId r:id="rId31"/>
+    <p:notesMasterId r:id="rId33"/>
   </p:notesMasterIdLst>
   <p:sldIdLst>
     <p:sldId id="272" r:id="rId2"/>
@@ -34,9 +34,11 @@
     <p:sldId id="339" r:id="rId25"/>
     <p:sldId id="341" r:id="rId26"/>
     <p:sldId id="342" r:id="rId27"/>
-    <p:sldId id="343" r:id="rId28"/>
-    <p:sldId id="340" r:id="rId29"/>
-    <p:sldId id="346" r:id="rId30"/>
+    <p:sldId id="348" r:id="rId28"/>
+    <p:sldId id="343" r:id="rId29"/>
+    <p:sldId id="349" r:id="rId30"/>
+    <p:sldId id="340" r:id="rId31"/>
+    <p:sldId id="346" r:id="rId32"/>
   </p:sldIdLst>
   <p:sldSz cx="9144000" cy="6858000" type="screen4x3"/>
   <p:notesSz cx="6858000" cy="9144000"/>
@@ -237,7 +239,7 @@
             <a:fld id="{E433751C-2A1E-49FF-98B8-4E34323593E0}" type="datetimeFigureOut">
               <a:rPr lang="en-US" smtClean="0"/>
               <a:pPr/>
-              <a:t>7/8/2015</a:t>
+              <a:t>7/23/2015</a:t>
             </a:fld>
             <a:endParaRPr lang="en-US"/>
           </a:p>
@@ -1433,7 +1435,7 @@
     </p:spTree>
     <p:extLst>
       <p:ext uri="{BB962C8B-B14F-4D97-AF65-F5344CB8AC3E}">
-        <p14:creationId xmlns:p14="http://schemas.microsoft.com/office/powerpoint/2010/main" val="1857746699"/>
+        <p14:creationId xmlns:p14="http://schemas.microsoft.com/office/powerpoint/2010/main" val="1663115341"/>
       </p:ext>
     </p:extLst>
   </p:cSld>
@@ -1603,7 +1605,7 @@
     </p:spTree>
     <p:extLst>
       <p:ext uri="{BB962C8B-B14F-4D97-AF65-F5344CB8AC3E}">
-        <p14:creationId xmlns:p14="http://schemas.microsoft.com/office/powerpoint/2010/main" val="2077349525"/>
+        <p14:creationId xmlns:p14="http://schemas.microsoft.com/office/powerpoint/2010/main" val="1857746699"/>
       </p:ext>
     </p:extLst>
   </p:cSld>
@@ -1680,6 +1682,176 @@
               <a:rPr lang="en-US" smtClean="0"/>
               <a:pPr/>
               <a:t>29</a:t>
+            </a:fld>
+            <a:endParaRPr lang="en-US"/>
+          </a:p>
+        </p:txBody>
+      </p:sp>
+    </p:spTree>
+    <p:extLst>
+      <p:ext uri="{BB962C8B-B14F-4D97-AF65-F5344CB8AC3E}">
+        <p14:creationId xmlns:p14="http://schemas.microsoft.com/office/powerpoint/2010/main" val="2173566454"/>
+      </p:ext>
+    </p:extLst>
+  </p:cSld>
+  <p:clrMapOvr>
+    <a:masterClrMapping/>
+  </p:clrMapOvr>
+</p:notes>
+</file>
+
+<file path=ppt/notesSlides/notesSlide22.xml><?xml version="1.0" encoding="utf-8"?>
+<p:notes xmlns:a="http://schemas.openxmlformats.org/drawingml/2006/main" xmlns:r="http://schemas.openxmlformats.org/officeDocument/2006/relationships" xmlns:p="http://schemas.openxmlformats.org/presentationml/2006/main">
+  <p:cSld>
+    <p:spTree>
+      <p:nvGrpSpPr>
+        <p:cNvPr id="1" name=""/>
+        <p:cNvGrpSpPr/>
+        <p:nvPr/>
+      </p:nvGrpSpPr>
+      <p:grpSpPr>
+        <a:xfrm>
+          <a:off x="0" y="0"/>
+          <a:ext cx="0" cy="0"/>
+          <a:chOff x="0" y="0"/>
+          <a:chExt cx="0" cy="0"/>
+        </a:xfrm>
+      </p:grpSpPr>
+      <p:sp>
+        <p:nvSpPr>
+          <p:cNvPr id="2" name="Slide Image Placeholder 1"/>
+          <p:cNvSpPr>
+            <a:spLocks noGrp="1" noRot="1" noChangeAspect="1"/>
+          </p:cNvSpPr>
+          <p:nvPr>
+            <p:ph type="sldImg"/>
+          </p:nvPr>
+        </p:nvSpPr>
+        <p:spPr/>
+      </p:sp>
+      <p:sp>
+        <p:nvSpPr>
+          <p:cNvPr id="3" name="Notes Placeholder 2"/>
+          <p:cNvSpPr>
+            <a:spLocks noGrp="1"/>
+          </p:cNvSpPr>
+          <p:nvPr>
+            <p:ph type="body" idx="1"/>
+          </p:nvPr>
+        </p:nvSpPr>
+        <p:spPr/>
+        <p:txBody>
+          <a:bodyPr/>
+          <a:lstStyle/>
+          <a:p>
+            <a:endParaRPr lang="en-GB" dirty="0"/>
+          </a:p>
+        </p:txBody>
+      </p:sp>
+      <p:sp>
+        <p:nvSpPr>
+          <p:cNvPr id="4" name="Slide Number Placeholder 3"/>
+          <p:cNvSpPr>
+            <a:spLocks noGrp="1"/>
+          </p:cNvSpPr>
+          <p:nvPr>
+            <p:ph type="sldNum" sz="quarter" idx="10"/>
+          </p:nvPr>
+        </p:nvSpPr>
+        <p:spPr/>
+        <p:txBody>
+          <a:bodyPr/>
+          <a:lstStyle/>
+          <a:p>
+            <a:fld id="{6737CF0C-9237-4D44-A0B7-6FE43C5E1D74}" type="slidenum">
+              <a:rPr lang="en-US" smtClean="0"/>
+              <a:pPr/>
+              <a:t>30</a:t>
+            </a:fld>
+            <a:endParaRPr lang="en-US"/>
+          </a:p>
+        </p:txBody>
+      </p:sp>
+    </p:spTree>
+    <p:extLst>
+      <p:ext uri="{BB962C8B-B14F-4D97-AF65-F5344CB8AC3E}">
+        <p14:creationId xmlns:p14="http://schemas.microsoft.com/office/powerpoint/2010/main" val="2077349525"/>
+      </p:ext>
+    </p:extLst>
+  </p:cSld>
+  <p:clrMapOvr>
+    <a:masterClrMapping/>
+  </p:clrMapOvr>
+</p:notes>
+</file>
+
+<file path=ppt/notesSlides/notesSlide23.xml><?xml version="1.0" encoding="utf-8"?>
+<p:notes xmlns:a="http://schemas.openxmlformats.org/drawingml/2006/main" xmlns:r="http://schemas.openxmlformats.org/officeDocument/2006/relationships" xmlns:p="http://schemas.openxmlformats.org/presentationml/2006/main">
+  <p:cSld>
+    <p:spTree>
+      <p:nvGrpSpPr>
+        <p:cNvPr id="1" name=""/>
+        <p:cNvGrpSpPr/>
+        <p:nvPr/>
+      </p:nvGrpSpPr>
+      <p:grpSpPr>
+        <a:xfrm>
+          <a:off x="0" y="0"/>
+          <a:ext cx="0" cy="0"/>
+          <a:chOff x="0" y="0"/>
+          <a:chExt cx="0" cy="0"/>
+        </a:xfrm>
+      </p:grpSpPr>
+      <p:sp>
+        <p:nvSpPr>
+          <p:cNvPr id="2" name="Slide Image Placeholder 1"/>
+          <p:cNvSpPr>
+            <a:spLocks noGrp="1" noRot="1" noChangeAspect="1"/>
+          </p:cNvSpPr>
+          <p:nvPr>
+            <p:ph type="sldImg"/>
+          </p:nvPr>
+        </p:nvSpPr>
+        <p:spPr/>
+      </p:sp>
+      <p:sp>
+        <p:nvSpPr>
+          <p:cNvPr id="3" name="Notes Placeholder 2"/>
+          <p:cNvSpPr>
+            <a:spLocks noGrp="1"/>
+          </p:cNvSpPr>
+          <p:nvPr>
+            <p:ph type="body" idx="1"/>
+          </p:nvPr>
+        </p:nvSpPr>
+        <p:spPr/>
+        <p:txBody>
+          <a:bodyPr/>
+          <a:lstStyle/>
+          <a:p>
+            <a:endParaRPr lang="en-GB" dirty="0"/>
+          </a:p>
+        </p:txBody>
+      </p:sp>
+      <p:sp>
+        <p:nvSpPr>
+          <p:cNvPr id="4" name="Slide Number Placeholder 3"/>
+          <p:cNvSpPr>
+            <a:spLocks noGrp="1"/>
+          </p:cNvSpPr>
+          <p:nvPr>
+            <p:ph type="sldNum" sz="quarter" idx="10"/>
+          </p:nvPr>
+        </p:nvSpPr>
+        <p:spPr/>
+        <p:txBody>
+          <a:bodyPr/>
+          <a:lstStyle/>
+          <a:p>
+            <a:fld id="{6737CF0C-9237-4D44-A0B7-6FE43C5E1D74}" type="slidenum">
+              <a:rPr lang="en-US" smtClean="0"/>
+              <a:pPr/>
+              <a:t>31</a:t>
             </a:fld>
             <a:endParaRPr lang="en-US"/>
           </a:p>
@@ -2597,11 +2769,7 @@
             </a:fld>
             <a:r>
               <a:rPr lang="en-GB" dirty="0" smtClean="0"/>
-              <a:t>/</a:t>
-            </a:r>
-            <a:r>
-              <a:rPr lang="en-GB" dirty="0" smtClean="0"/>
-              <a:t>29</a:t>
+              <a:t>/31</a:t>
             </a:r>
             <a:endParaRPr lang="en-GB" dirty="0"/>
           </a:p>
@@ -7362,15 +7530,7 @@
           <a:p>
             <a:r>
               <a:rPr lang="en-US" sz="2400" b="1" dirty="0" smtClean="0"/>
-              <a:t>Configuration </a:t>
-            </a:r>
-            <a:r>
-              <a:rPr lang="en-US" sz="2400" b="1" dirty="0" smtClean="0"/>
-              <a:t>(Joint) Space </a:t>
-            </a:r>
-            <a:r>
-              <a:rPr lang="en-US" sz="2400" b="1" dirty="0" smtClean="0"/>
-              <a:t>Control</a:t>
+              <a:t>Configuration (Joint) Space Control</a:t>
             </a:r>
             <a:endParaRPr lang="en-US" sz="2400" dirty="0" smtClean="0"/>
           </a:p>
@@ -10541,7 +10701,11 @@
             <a:pPr algn="ctr"/>
             <a:r>
               <a:rPr lang="en-US" sz="2800" b="1" dirty="0" smtClean="0"/>
-              <a:t>Gaze Interface (1/4)</a:t>
+              <a:t>Gaze Interface (</a:t>
+            </a:r>
+            <a:r>
+              <a:rPr lang="en-US" sz="2800" b="1" dirty="0" smtClean="0"/>
+              <a:t>1/6)</a:t>
             </a:r>
             <a:endParaRPr lang="en-US" sz="2800" b="1" dirty="0"/>
           </a:p>
@@ -11126,395 +11290,76 @@
             </a:r>
             <a:r>
               <a:rPr lang="en-US" sz="2800" b="1" dirty="0" smtClean="0"/>
-              <a:t>(2/4</a:t>
-            </a:r>
-            <a:r>
-              <a:rPr lang="en-US" sz="2800" b="1" dirty="0"/>
-              <a:t>)</a:t>
-            </a:r>
+              <a:t>(</a:t>
+            </a:r>
+            <a:r>
+              <a:rPr lang="en-US" sz="2800" b="1" dirty="0" smtClean="0"/>
+              <a:t>2/6)</a:t>
+            </a:r>
+            <a:endParaRPr lang="en-US" sz="2800" b="1" dirty="0"/>
           </a:p>
         </p:txBody>
       </p:sp>
-      <p:grpSp>
-        <p:nvGrpSpPr>
-          <p:cNvPr id="9" name="Group 8"/>
-          <p:cNvGrpSpPr/>
-          <p:nvPr/>
-        </p:nvGrpSpPr>
-        <p:grpSpPr>
-          <a:xfrm>
-            <a:off x="508725" y="1170923"/>
-            <a:ext cx="8199846" cy="2352173"/>
-            <a:chOff x="508725" y="1174123"/>
-            <a:chExt cx="8199846" cy="2352173"/>
-          </a:xfrm>
-        </p:grpSpPr>
-        <p:sp>
-          <p:nvSpPr>
-            <p:cNvPr id="10" name="TextBox 9"/>
-            <p:cNvSpPr txBox="1"/>
-            <p:nvPr/>
-          </p:nvSpPr>
-          <p:spPr>
-            <a:xfrm>
-              <a:off x="551543" y="1494971"/>
-              <a:ext cx="8157028" cy="2031325"/>
-            </a:xfrm>
-            <a:prstGeom prst="rect">
-              <a:avLst/>
-            </a:prstGeom>
-            <a:solidFill>
-              <a:schemeClr val="accent5">
-                <a:lumMod val="20000"/>
-                <a:lumOff val="80000"/>
-                <a:alpha val="50000"/>
-              </a:schemeClr>
-            </a:solidFill>
-            <a:ln w="12700">
-              <a:solidFill>
-                <a:schemeClr val="accent5"/>
-              </a:solidFill>
-            </a:ln>
-          </p:spPr>
-          <p:txBody>
-            <a:bodyPr wrap="square" rtlCol="0">
-              <a:spAutoFit/>
-            </a:bodyPr>
-            <a:lstStyle/>
-            <a:p>
-              <a:r>
-                <a:rPr lang="pt-BR" dirty="0">
-                  <a:latin typeface="Consolas" panose="020B0609020204030204" pitchFamily="49" charset="0"/>
-                  <a:cs typeface="Consolas" panose="020B0609020204030204" pitchFamily="49" charset="0"/>
-                </a:rPr>
-                <a:t>i</a:t>
-              </a:r>
-              <a:r>
-                <a:rPr lang="pt-BR" dirty="0" smtClean="0">
-                  <a:latin typeface="Consolas" panose="020B0609020204030204" pitchFamily="49" charset="0"/>
-                  <a:cs typeface="Consolas" panose="020B0609020204030204" pitchFamily="49" charset="0"/>
-                </a:rPr>
-                <a:t>nt camSel=0;	</a:t>
-              </a:r>
-              <a:r>
-                <a:rPr lang="pt-BR" i="1" dirty="0" smtClean="0">
-                  <a:solidFill>
-                    <a:srgbClr val="00B050"/>
-                  </a:solidFill>
-                  <a:latin typeface="Consolas" panose="020B0609020204030204" pitchFamily="49" charset="0"/>
-                  <a:cs typeface="Consolas" panose="020B0609020204030204" pitchFamily="49" charset="0"/>
-                </a:rPr>
-                <a:t>// 0 =&gt; left, 1 =&gt; right</a:t>
-              </a:r>
-            </a:p>
-            <a:p>
-              <a:r>
-                <a:rPr lang="pt-BR" dirty="0" smtClean="0">
-                  <a:latin typeface="Consolas" panose="020B0609020204030204" pitchFamily="49" charset="0"/>
-                  <a:cs typeface="Consolas" panose="020B0609020204030204" pitchFamily="49" charset="0"/>
-                </a:rPr>
-                <a:t>Vector px(2);</a:t>
-              </a:r>
-            </a:p>
-            <a:p>
-              <a:r>
-                <a:rPr lang="pt-BR" dirty="0">
-                  <a:latin typeface="Consolas" panose="020B0609020204030204" pitchFamily="49" charset="0"/>
-                  <a:cs typeface="Consolas" panose="020B0609020204030204" pitchFamily="49" charset="0"/>
-                </a:rPr>
-                <a:t>p</a:t>
-              </a:r>
-              <a:r>
-                <a:rPr lang="pt-BR" dirty="0" smtClean="0">
-                  <a:latin typeface="Consolas" panose="020B0609020204030204" pitchFamily="49" charset="0"/>
-                  <a:cs typeface="Consolas" panose="020B0609020204030204" pitchFamily="49" charset="0"/>
-                </a:rPr>
-                <a:t>x[0]=100;</a:t>
-              </a:r>
-            </a:p>
-            <a:p>
-              <a:r>
-                <a:rPr lang="pt-BR" dirty="0" smtClean="0">
-                  <a:latin typeface="Consolas" panose="020B0609020204030204" pitchFamily="49" charset="0"/>
-                  <a:cs typeface="Consolas" panose="020B0609020204030204" pitchFamily="49" charset="0"/>
-                </a:rPr>
-                <a:t>px[1]=50;</a:t>
-              </a:r>
-            </a:p>
-            <a:p>
-              <a:r>
-                <a:rPr lang="pt-BR" dirty="0">
-                  <a:latin typeface="Consolas" panose="020B0609020204030204" pitchFamily="49" charset="0"/>
-                  <a:cs typeface="Consolas" panose="020B0609020204030204" pitchFamily="49" charset="0"/>
-                </a:rPr>
-                <a:t>d</a:t>
-              </a:r>
-              <a:r>
-                <a:rPr lang="pt-BR" dirty="0" smtClean="0">
-                  <a:latin typeface="Consolas" panose="020B0609020204030204" pitchFamily="49" charset="0"/>
-                  <a:cs typeface="Consolas" panose="020B0609020204030204" pitchFamily="49" charset="0"/>
-                </a:rPr>
-                <a:t>ouble z=1.0;</a:t>
-              </a:r>
-            </a:p>
-            <a:p>
-              <a:endParaRPr lang="pt-BR" dirty="0" smtClean="0">
-                <a:latin typeface="Consolas" panose="020B0609020204030204" pitchFamily="49" charset="0"/>
-                <a:cs typeface="Consolas" panose="020B0609020204030204" pitchFamily="49" charset="0"/>
-              </a:endParaRPr>
-            </a:p>
-            <a:p>
-              <a:r>
-                <a:rPr lang="pt-BR" dirty="0" smtClean="0">
-                  <a:latin typeface="Consolas" panose="020B0609020204030204" pitchFamily="49" charset="0"/>
-                  <a:cs typeface="Consolas" panose="020B0609020204030204" pitchFamily="49" charset="0"/>
-                </a:rPr>
-                <a:t>igaze-&gt;</a:t>
-              </a:r>
-              <a:r>
-                <a:rPr lang="pt-BR" b="1" dirty="0" smtClean="0">
-                  <a:latin typeface="Consolas" panose="020B0609020204030204" pitchFamily="49" charset="0"/>
-                  <a:cs typeface="Consolas" panose="020B0609020204030204" pitchFamily="49" charset="0"/>
-                </a:rPr>
-                <a:t>lookAtMonoPixel</a:t>
-              </a:r>
-              <a:r>
-                <a:rPr lang="pt-BR" dirty="0" smtClean="0">
-                  <a:latin typeface="Consolas" panose="020B0609020204030204" pitchFamily="49" charset="0"/>
-                  <a:cs typeface="Consolas" panose="020B0609020204030204" pitchFamily="49" charset="0"/>
-                </a:rPr>
-                <a:t>(camSel,px,z);</a:t>
-              </a:r>
-            </a:p>
-          </p:txBody>
-        </p:sp>
-        <p:sp>
-          <p:nvSpPr>
-            <p:cNvPr id="11" name="TextBox 10"/>
-            <p:cNvSpPr txBox="1"/>
-            <p:nvPr/>
-          </p:nvSpPr>
-          <p:spPr>
-            <a:xfrm>
-              <a:off x="508725" y="1174123"/>
-              <a:ext cx="3924023" cy="400110"/>
-            </a:xfrm>
-            <a:prstGeom prst="rect">
-              <a:avLst/>
-            </a:prstGeom>
-            <a:noFill/>
-          </p:spPr>
-          <p:txBody>
-            <a:bodyPr wrap="none" rtlCol="0">
-              <a:spAutoFit/>
-            </a:bodyPr>
-            <a:lstStyle/>
-            <a:p>
-              <a:r>
-                <a:rPr lang="en-GB" sz="2000" b="1" dirty="0" smtClean="0"/>
-                <a:t>LOOK AT POINT IN IMAGE DOMAIN</a:t>
-              </a:r>
-              <a:endParaRPr lang="en-GB" sz="2000" b="1" dirty="0"/>
-            </a:p>
-          </p:txBody>
-        </p:sp>
-      </p:grpSp>
-      <p:grpSp>
-        <p:nvGrpSpPr>
-          <p:cNvPr id="17" name="Group 16"/>
-          <p:cNvGrpSpPr/>
-          <p:nvPr/>
-        </p:nvGrpSpPr>
-        <p:grpSpPr>
-          <a:xfrm>
-            <a:off x="505848" y="4515098"/>
-            <a:ext cx="8199846" cy="1244178"/>
-            <a:chOff x="508725" y="1174123"/>
-            <a:chExt cx="8199846" cy="1244178"/>
-          </a:xfrm>
-        </p:grpSpPr>
-        <p:sp>
-          <p:nvSpPr>
-            <p:cNvPr id="19" name="TextBox 18"/>
-            <p:cNvSpPr txBox="1"/>
-            <p:nvPr/>
-          </p:nvSpPr>
-          <p:spPr>
-            <a:xfrm>
-              <a:off x="551543" y="1494971"/>
-              <a:ext cx="8157028" cy="923330"/>
-            </a:xfrm>
-            <a:prstGeom prst="rect">
-              <a:avLst/>
-            </a:prstGeom>
-            <a:solidFill>
-              <a:schemeClr val="accent5">
-                <a:lumMod val="20000"/>
-                <a:lumOff val="80000"/>
-                <a:alpha val="50000"/>
-              </a:schemeClr>
-            </a:solidFill>
-            <a:ln w="12700">
-              <a:solidFill>
-                <a:schemeClr val="accent5"/>
-              </a:solidFill>
-            </a:ln>
-          </p:spPr>
-          <p:txBody>
-            <a:bodyPr wrap="square" rtlCol="0">
-              <a:spAutoFit/>
-            </a:bodyPr>
-            <a:lstStyle/>
-            <a:p>
-              <a:r>
-                <a:rPr lang="pt-BR" dirty="0" smtClean="0">
-                  <a:latin typeface="Consolas" panose="020B0609020204030204" pitchFamily="49" charset="0"/>
-                  <a:cs typeface="Consolas" panose="020B0609020204030204" pitchFamily="49" charset="0"/>
-                </a:rPr>
-                <a:t>Vector x;</a:t>
-              </a:r>
-            </a:p>
-            <a:p>
-              <a:r>
-                <a:rPr lang="pt-BR" dirty="0">
-                  <a:latin typeface="Consolas" panose="020B0609020204030204" pitchFamily="49" charset="0"/>
-                  <a:cs typeface="Consolas" panose="020B0609020204030204" pitchFamily="49" charset="0"/>
-                </a:rPr>
-                <a:t>i</a:t>
-              </a:r>
-              <a:r>
-                <a:rPr lang="pt-BR" dirty="0" smtClean="0">
-                  <a:latin typeface="Consolas" panose="020B0609020204030204" pitchFamily="49" charset="0"/>
-                  <a:cs typeface="Consolas" panose="020B0609020204030204" pitchFamily="49" charset="0"/>
-                </a:rPr>
-                <a:t>gaze-&gt;</a:t>
-              </a:r>
-              <a:r>
-                <a:rPr lang="pt-BR" b="1" dirty="0" smtClean="0">
-                  <a:latin typeface="Consolas" panose="020B0609020204030204" pitchFamily="49" charset="0"/>
-                  <a:cs typeface="Consolas" panose="020B0609020204030204" pitchFamily="49" charset="0"/>
-                </a:rPr>
-                <a:t>get3DPoint</a:t>
-              </a:r>
-              <a:r>
-                <a:rPr lang="pt-BR" dirty="0" smtClean="0">
-                  <a:latin typeface="Consolas" panose="020B0609020204030204" pitchFamily="49" charset="0"/>
-                  <a:cs typeface="Consolas" panose="020B0609020204030204" pitchFamily="49" charset="0"/>
-                </a:rPr>
-                <a:t>(camSel,px,z,x);</a:t>
-              </a:r>
-            </a:p>
-            <a:p>
-              <a:r>
-                <a:rPr lang="pt-BR" dirty="0">
-                  <a:latin typeface="Consolas" panose="020B0609020204030204" pitchFamily="49" charset="0"/>
-                  <a:cs typeface="Consolas" panose="020B0609020204030204" pitchFamily="49" charset="0"/>
-                </a:rPr>
-                <a:t>i</a:t>
-              </a:r>
-              <a:r>
-                <a:rPr lang="pt-BR" dirty="0" smtClean="0">
-                  <a:latin typeface="Consolas" panose="020B0609020204030204" pitchFamily="49" charset="0"/>
-                  <a:cs typeface="Consolas" panose="020B0609020204030204" pitchFamily="49" charset="0"/>
-                </a:rPr>
-                <a:t>gaze-&gt;</a:t>
-              </a:r>
-              <a:r>
-                <a:rPr lang="pt-BR" b="1" dirty="0" smtClean="0">
-                  <a:latin typeface="Consolas" panose="020B0609020204030204" pitchFamily="49" charset="0"/>
-                  <a:cs typeface="Consolas" panose="020B0609020204030204" pitchFamily="49" charset="0"/>
-                </a:rPr>
-                <a:t>lookAtFixationPoint</a:t>
-              </a:r>
-              <a:r>
-                <a:rPr lang="pt-BR" dirty="0" smtClean="0">
-                  <a:latin typeface="Consolas" panose="020B0609020204030204" pitchFamily="49" charset="0"/>
-                  <a:cs typeface="Consolas" panose="020B0609020204030204" pitchFamily="49" charset="0"/>
-                </a:rPr>
-                <a:t>(x);</a:t>
-              </a:r>
-            </a:p>
-          </p:txBody>
-        </p:sp>
-        <p:sp>
-          <p:nvSpPr>
-            <p:cNvPr id="20" name="TextBox 19"/>
-            <p:cNvSpPr txBox="1"/>
-            <p:nvPr/>
-          </p:nvSpPr>
-          <p:spPr>
-            <a:xfrm>
-              <a:off x="508725" y="1174123"/>
-              <a:ext cx="2131481" cy="400110"/>
-            </a:xfrm>
-            <a:prstGeom prst="rect">
-              <a:avLst/>
-            </a:prstGeom>
-            <a:noFill/>
-          </p:spPr>
-          <p:txBody>
-            <a:bodyPr wrap="none" rtlCol="0">
-              <a:spAutoFit/>
-            </a:bodyPr>
-            <a:lstStyle/>
-            <a:p>
-              <a:r>
-                <a:rPr lang="en-GB" sz="2000" b="1" dirty="0" smtClean="0"/>
-                <a:t>… EQUIVALENT TO</a:t>
-              </a:r>
-              <a:endParaRPr lang="en-GB" sz="2000" b="1" dirty="0"/>
-            </a:p>
-          </p:txBody>
-        </p:sp>
-      </p:grpSp>
       <p:sp>
         <p:nvSpPr>
-          <p:cNvPr id="3" name="Equal 2"/>
-          <p:cNvSpPr/>
+          <p:cNvPr id="11" name="TextBox 10"/>
+          <p:cNvSpPr txBox="1"/>
           <p:nvPr/>
         </p:nvSpPr>
         <p:spPr>
           <a:xfrm>
-            <a:off x="4247617" y="3843944"/>
-            <a:ext cx="759125" cy="671154"/>
+            <a:off x="508725" y="1170923"/>
+            <a:ext cx="3924023" cy="400110"/>
           </a:xfrm>
-          <a:prstGeom prst="mathEqual">
-            <a:avLst>
-              <a:gd name="adj1" fmla="val 23520"/>
-              <a:gd name="adj2" fmla="val 11760"/>
-            </a:avLst>
+          <a:prstGeom prst="rect">
+            <a:avLst/>
           </a:prstGeom>
-          <a:solidFill>
-            <a:srgbClr val="00B0F0"/>
-          </a:solidFill>
+          <a:noFill/>
         </p:spPr>
-        <p:style>
-          <a:lnRef idx="1">
-            <a:schemeClr val="accent1"/>
-          </a:lnRef>
-          <a:fillRef idx="3">
-            <a:schemeClr val="accent1"/>
-          </a:fillRef>
-          <a:effectRef idx="2">
-            <a:schemeClr val="accent1"/>
-          </a:effectRef>
-          <a:fontRef idx="minor">
-            <a:schemeClr val="lt1"/>
-          </a:fontRef>
-        </p:style>
         <p:txBody>
-          <a:bodyPr rtlCol="0" anchor="ctr"/>
+          <a:bodyPr wrap="none" rtlCol="0">
+            <a:spAutoFit/>
+          </a:bodyPr>
           <a:lstStyle/>
           <a:p>
-            <a:pPr algn="ctr"/>
-            <a:endParaRPr lang="en-GB">
-              <a:solidFill>
-                <a:schemeClr val="tx1"/>
-              </a:solidFill>
-            </a:endParaRPr>
+            <a:r>
+              <a:rPr lang="en-GB" sz="2000" b="1" dirty="0" smtClean="0"/>
+              <a:t>LOOK AT POINT IN IMAGE DOMAIN</a:t>
+            </a:r>
+            <a:endParaRPr lang="en-GB" sz="2000" b="1" dirty="0"/>
           </a:p>
         </p:txBody>
       </p:sp>
+      <p:pic>
+        <p:nvPicPr>
+          <p:cNvPr id="2" name="Picture 1"/>
+          <p:cNvPicPr>
+            <a:picLocks noChangeAspect="1"/>
+          </p:cNvPicPr>
+          <p:nvPr/>
+        </p:nvPicPr>
+        <p:blipFill>
+          <a:blip r:embed="rId3">
+            <a:extLst>
+              <a:ext uri="{28A0092B-C50C-407E-A947-70E740481C1C}">
+                <a14:useLocalDpi xmlns:a14="http://schemas.microsoft.com/office/drawing/2010/main" val="0"/>
+              </a:ext>
+            </a:extLst>
+          </a:blip>
+          <a:stretch>
+            <a:fillRect/>
+          </a:stretch>
+        </p:blipFill>
+        <p:spPr>
+          <a:xfrm>
+            <a:off x="1010434" y="1761228"/>
+            <a:ext cx="7108475" cy="4021365"/>
+          </a:xfrm>
+          <a:prstGeom prst="rect">
+            <a:avLst/>
+          </a:prstGeom>
+        </p:spPr>
+      </p:pic>
     </p:spTree>
     <p:extLst>
       <p:ext uri="{BB962C8B-B14F-4D97-AF65-F5344CB8AC3E}">
@@ -11585,12 +11430,17 @@
             </a:r>
             <a:r>
               <a:rPr lang="en-US" sz="2800" b="1" dirty="0" smtClean="0"/>
-              <a:t>(3/4</a:t>
+              <a:t>(</a:t>
             </a:r>
             <a:r>
               <a:rPr lang="en-US" sz="2800" b="1" dirty="0"/>
-              <a:t>)</a:t>
-            </a:r>
+              <a:t>3</a:t>
+            </a:r>
+            <a:r>
+              <a:rPr lang="en-US" sz="2800" b="1" dirty="0" smtClean="0"/>
+              <a:t>/6)</a:t>
+            </a:r>
+            <a:endParaRPr lang="en-US" sz="2800" b="1" dirty="0"/>
           </a:p>
         </p:txBody>
       </p:sp>
@@ -11603,9 +11453,9 @@
         <p:grpSpPr>
           <a:xfrm>
             <a:off x="508725" y="1170923"/>
-            <a:ext cx="8199846" cy="1521177"/>
+            <a:ext cx="8199846" cy="2352173"/>
             <a:chOff x="508725" y="1174123"/>
-            <a:chExt cx="8199846" cy="1521177"/>
+            <a:chExt cx="8199846" cy="2352173"/>
           </a:xfrm>
         </p:grpSpPr>
         <p:sp>
@@ -11617,7 +11467,7 @@
           <p:spPr>
             <a:xfrm>
               <a:off x="551543" y="1494971"/>
-              <a:ext cx="8157028" cy="1200329"/>
+              <a:ext cx="8157028" cy="2031325"/>
             </a:xfrm>
             <a:prstGeom prst="rect">
               <a:avLst/>
@@ -11642,11 +11492,28 @@
             <a:lstStyle/>
             <a:p>
               <a:r>
+                <a:rPr lang="pt-BR" dirty="0">
+                  <a:latin typeface="Consolas" panose="020B0609020204030204" pitchFamily="49" charset="0"/>
+                  <a:cs typeface="Consolas" panose="020B0609020204030204" pitchFamily="49" charset="0"/>
+                </a:rPr>
+                <a:t>i</a:t>
+              </a:r>
+              <a:r>
                 <a:rPr lang="pt-BR" dirty="0" smtClean="0">
                   <a:latin typeface="Consolas" panose="020B0609020204030204" pitchFamily="49" charset="0"/>
                   <a:cs typeface="Consolas" panose="020B0609020204030204" pitchFamily="49" charset="0"/>
                 </a:rPr>
-                <a:t>Vector x;</a:t>
+                <a:t>nt camSel=0;	</a:t>
+              </a:r>
+              <a:r>
+                <a:rPr lang="pt-BR" i="1" dirty="0" smtClean="0">
+                  <a:solidFill>
+                    <a:srgbClr val="00B050"/>
+                  </a:solidFill>
+                  <a:latin typeface="Consolas" panose="020B0609020204030204" pitchFamily="49" charset="0"/>
+                  <a:cs typeface="Consolas" panose="020B0609020204030204" pitchFamily="49" charset="0"/>
+                </a:rPr>
+                <a:t>// 0 =&gt; left, 1 =&gt; right</a:t>
               </a:r>
             </a:p>
             <a:p>
@@ -11655,6 +11522,62 @@
                   <a:latin typeface="Consolas" panose="020B0609020204030204" pitchFamily="49" charset="0"/>
                   <a:cs typeface="Consolas" panose="020B0609020204030204" pitchFamily="49" charset="0"/>
                 </a:rPr>
+                <a:t>Vector px(2);</a:t>
+              </a:r>
+            </a:p>
+            <a:p>
+              <a:r>
+                <a:rPr lang="pt-BR" dirty="0">
+                  <a:latin typeface="Consolas" panose="020B0609020204030204" pitchFamily="49" charset="0"/>
+                  <a:cs typeface="Consolas" panose="020B0609020204030204" pitchFamily="49" charset="0"/>
+                </a:rPr>
+                <a:t>p</a:t>
+              </a:r>
+              <a:r>
+                <a:rPr lang="pt-BR" dirty="0" smtClean="0">
+                  <a:latin typeface="Consolas" panose="020B0609020204030204" pitchFamily="49" charset="0"/>
+                  <a:cs typeface="Consolas" panose="020B0609020204030204" pitchFamily="49" charset="0"/>
+                </a:rPr>
+                <a:t>x[0]=100;</a:t>
+              </a:r>
+            </a:p>
+            <a:p>
+              <a:r>
+                <a:rPr lang="pt-BR" dirty="0" smtClean="0">
+                  <a:latin typeface="Consolas" panose="020B0609020204030204" pitchFamily="49" charset="0"/>
+                  <a:cs typeface="Consolas" panose="020B0609020204030204" pitchFamily="49" charset="0"/>
+                </a:rPr>
+                <a:t>px[1]=50;</a:t>
+              </a:r>
+            </a:p>
+            <a:p>
+              <a:r>
+                <a:rPr lang="pt-BR" dirty="0">
+                  <a:latin typeface="Consolas" panose="020B0609020204030204" pitchFamily="49" charset="0"/>
+                  <a:cs typeface="Consolas" panose="020B0609020204030204" pitchFamily="49" charset="0"/>
+                </a:rPr>
+                <a:t>d</a:t>
+              </a:r>
+              <a:r>
+                <a:rPr lang="pt-BR" dirty="0" smtClean="0">
+                  <a:latin typeface="Consolas" panose="020B0609020204030204" pitchFamily="49" charset="0"/>
+                  <a:cs typeface="Consolas" panose="020B0609020204030204" pitchFamily="49" charset="0"/>
+                </a:rPr>
+                <a:t>ouble z=1.0;</a:t>
+              </a:r>
+            </a:p>
+            <a:p>
+              <a:endParaRPr lang="pt-BR" dirty="0" smtClean="0">
+                <a:latin typeface="Consolas" panose="020B0609020204030204" pitchFamily="49" charset="0"/>
+                <a:cs typeface="Consolas" panose="020B0609020204030204" pitchFamily="49" charset="0"/>
+              </a:endParaRPr>
+            </a:p>
+            <a:p>
+              <a:r>
+                <a:rPr lang="pt-BR" dirty="0" smtClean="0">
+                  <a:latin typeface="Consolas" panose="020B0609020204030204" pitchFamily="49" charset="0"/>
+                  <a:cs typeface="Consolas" panose="020B0609020204030204" pitchFamily="49" charset="0"/>
+                </a:rPr>
                 <a:t>igaze-&gt;</a:t>
               </a:r>
               <a:r>
@@ -11662,67 +11585,14 @@
                   <a:latin typeface="Consolas" panose="020B0609020204030204" pitchFamily="49" charset="0"/>
                   <a:cs typeface="Consolas" panose="020B0609020204030204" pitchFamily="49" charset="0"/>
                 </a:rPr>
-                <a:t>get3DPointOnPlane</a:t>
+                <a:t>lookAtMonoPixel</a:t>
               </a:r>
               <a:r>
                 <a:rPr lang="pt-BR" dirty="0" smtClean="0">
                   <a:latin typeface="Consolas" panose="020B0609020204030204" pitchFamily="49" charset="0"/>
                   <a:cs typeface="Consolas" panose="020B0609020204030204" pitchFamily="49" charset="0"/>
                 </a:rPr>
-                <a:t>(camSel,px,plane,x);</a:t>
-              </a:r>
-            </a:p>
-            <a:p>
-              <a:r>
-                <a:rPr lang="pt-BR" dirty="0" smtClean="0">
-                  <a:latin typeface="Consolas" panose="020B0609020204030204" pitchFamily="49" charset="0"/>
-                  <a:cs typeface="Consolas" panose="020B0609020204030204" pitchFamily="49" charset="0"/>
-                </a:rPr>
-                <a:t>igaze-</a:t>
-              </a:r>
-              <a:r>
-                <a:rPr lang="pt-BR" dirty="0">
-                  <a:latin typeface="Consolas" panose="020B0609020204030204" pitchFamily="49" charset="0"/>
-                  <a:cs typeface="Consolas" panose="020B0609020204030204" pitchFamily="49" charset="0"/>
-                </a:rPr>
-                <a:t>&gt;</a:t>
-              </a:r>
-              <a:r>
-                <a:rPr lang="pt-BR" b="1" dirty="0" smtClean="0">
-                  <a:latin typeface="Consolas" panose="020B0609020204030204" pitchFamily="49" charset="0"/>
-                  <a:cs typeface="Consolas" panose="020B0609020204030204" pitchFamily="49" charset="0"/>
-                </a:rPr>
-                <a:t>get3DPointFromAngles</a:t>
-              </a:r>
-              <a:r>
-                <a:rPr lang="pt-BR" dirty="0" smtClean="0">
-                  <a:latin typeface="Consolas" panose="020B0609020204030204" pitchFamily="49" charset="0"/>
-                  <a:cs typeface="Consolas" panose="020B0609020204030204" pitchFamily="49" charset="0"/>
-                </a:rPr>
-                <a:t>(mode,ang,x);</a:t>
-              </a:r>
-            </a:p>
-            <a:p>
-              <a:r>
-                <a:rPr lang="pt-BR" dirty="0" smtClean="0">
-                  <a:latin typeface="Consolas" panose="020B0609020204030204" pitchFamily="49" charset="0"/>
-                  <a:cs typeface="Consolas" panose="020B0609020204030204" pitchFamily="49" charset="0"/>
-                </a:rPr>
-                <a:t>igaze-&gt;</a:t>
-              </a:r>
-              <a:r>
-                <a:rPr lang="pt-BR" b="1" dirty="0" smtClean="0">
-                  <a:latin typeface="Consolas" panose="020B0609020204030204" pitchFamily="49" charset="0"/>
-                  <a:cs typeface="Consolas" panose="020B0609020204030204" pitchFamily="49" charset="0"/>
-                </a:rPr>
-                <a:t>triangulate3DPoint</a:t>
-              </a:r>
-              <a:r>
-                <a:rPr lang="pt-BR" dirty="0" smtClean="0">
-                  <a:latin typeface="Consolas" panose="020B0609020204030204" pitchFamily="49" charset="0"/>
-                  <a:cs typeface="Consolas" panose="020B0609020204030204" pitchFamily="49" charset="0"/>
-                </a:rPr>
-                <a:t>(pxl,pxr,x);</a:t>
+                <a:t>(camSel,px,z);</a:t>
               </a:r>
             </a:p>
           </p:txBody>
@@ -11736,7 +11606,7 @@
           <p:spPr>
             <a:xfrm>
               <a:off x="508725" y="1174123"/>
-              <a:ext cx="2498313" cy="400110"/>
+              <a:ext cx="3924023" cy="400110"/>
             </a:xfrm>
             <a:prstGeom prst="rect">
               <a:avLst/>
@@ -11751,7 +11621,7 @@
             <a:p>
               <a:r>
                 <a:rPr lang="en-GB" sz="2000" b="1" dirty="0" smtClean="0"/>
-                <a:t>GEOMETRY OF PIXELS</a:t>
+                <a:t>LOOK AT POINT IN IMAGE DOMAIN</a:t>
               </a:r>
               <a:endParaRPr lang="en-GB" sz="2000" b="1" dirty="0"/>
             </a:p>
@@ -11760,28 +11630,28 @@
       </p:grpSp>
       <p:grpSp>
         <p:nvGrpSpPr>
-          <p:cNvPr id="13" name="Group 12"/>
+          <p:cNvPr id="17" name="Group 16"/>
           <p:cNvGrpSpPr/>
           <p:nvPr/>
         </p:nvGrpSpPr>
         <p:grpSpPr>
           <a:xfrm>
-            <a:off x="505848" y="2927828"/>
-            <a:ext cx="8199846" cy="3460169"/>
+            <a:off x="505848" y="4515098"/>
+            <a:ext cx="8199846" cy="1244178"/>
             <a:chOff x="508725" y="1174123"/>
-            <a:chExt cx="8199846" cy="3460169"/>
+            <a:chExt cx="8199846" cy="1244178"/>
           </a:xfrm>
         </p:grpSpPr>
         <p:sp>
           <p:nvSpPr>
-            <p:cNvPr id="14" name="TextBox 13"/>
+            <p:cNvPr id="19" name="TextBox 18"/>
             <p:cNvSpPr txBox="1"/>
             <p:nvPr/>
           </p:nvSpPr>
           <p:spPr>
             <a:xfrm>
               <a:off x="551543" y="1494971"/>
-              <a:ext cx="8157028" cy="3139321"/>
+              <a:ext cx="8157028" cy="923330"/>
             </a:xfrm>
             <a:prstGeom prst="rect">
               <a:avLst/>
@@ -11806,268 +11676,85 @@
             <a:lstStyle/>
             <a:p>
               <a:r>
+                <a:rPr lang="pt-BR" dirty="0" smtClean="0">
+                  <a:latin typeface="Consolas" panose="020B0609020204030204" pitchFamily="49" charset="0"/>
+                  <a:cs typeface="Consolas" panose="020B0609020204030204" pitchFamily="49" charset="0"/>
+                </a:rPr>
+                <a:t>Vector x;</a:t>
+              </a:r>
+            </a:p>
+            <a:p>
+              <a:r>
                 <a:rPr lang="pt-BR" dirty="0">
                   <a:latin typeface="Consolas" panose="020B0609020204030204" pitchFamily="49" charset="0"/>
                   <a:cs typeface="Consolas" panose="020B0609020204030204" pitchFamily="49" charset="0"/>
                 </a:rPr>
-                <a:t>Vector c(2</a:t>
+                <a:t>i</a:t>
               </a:r>
               <a:r>
                 <a:rPr lang="pt-BR" dirty="0" smtClean="0">
                   <a:latin typeface="Consolas" panose="020B0609020204030204" pitchFamily="49" charset="0"/>
                   <a:cs typeface="Consolas" panose="020B0609020204030204" pitchFamily="49" charset="0"/>
                 </a:rPr>
-                <a:t>); c[0</a:t>
-              </a:r>
+                <a:t>gaze-&gt;</a:t>
+              </a:r>
+              <a:r>
+                <a:rPr lang="pt-BR" b="1" dirty="0" smtClean="0">
+                  <a:latin typeface="Consolas" panose="020B0609020204030204" pitchFamily="49" charset="0"/>
+                  <a:cs typeface="Consolas" panose="020B0609020204030204" pitchFamily="49" charset="0"/>
+                </a:rPr>
+                <a:t>get3DPoint</a:t>
+              </a:r>
+              <a:r>
+                <a:rPr lang="pt-BR" dirty="0" smtClean="0">
+                  <a:latin typeface="Consolas" panose="020B0609020204030204" pitchFamily="49" charset="0"/>
+                  <a:cs typeface="Consolas" panose="020B0609020204030204" pitchFamily="49" charset="0"/>
+                </a:rPr>
+                <a:t>(camSel,px,z,x);</a:t>
+              </a:r>
+            </a:p>
+            <a:p>
               <a:r>
                 <a:rPr lang="pt-BR" dirty="0">
                   <a:latin typeface="Consolas" panose="020B0609020204030204" pitchFamily="49" charset="0"/>
                   <a:cs typeface="Consolas" panose="020B0609020204030204" pitchFamily="49" charset="0"/>
                 </a:rPr>
-                <a:t>]=</a:t>
+                <a:t>i</a:t>
               </a:r>
               <a:r>
                 <a:rPr lang="pt-BR" dirty="0" smtClean="0">
                   <a:latin typeface="Consolas" panose="020B0609020204030204" pitchFamily="49" charset="0"/>
                   <a:cs typeface="Consolas" panose="020B0609020204030204" pitchFamily="49" charset="0"/>
                 </a:rPr>
-                <a:t>160.0; c[1</a:t>
-              </a:r>
-              <a:r>
-                <a:rPr lang="pt-BR" dirty="0">
-                  <a:latin typeface="Consolas" panose="020B0609020204030204" pitchFamily="49" charset="0"/>
-                  <a:cs typeface="Consolas" panose="020B0609020204030204" pitchFamily="49" charset="0"/>
-                </a:rPr>
-                <a:t>]=120.0;</a:t>
-              </a:r>
-            </a:p>
-            <a:p>
-              <a:r>
-                <a:rPr lang="pt-BR" dirty="0">
-                  <a:latin typeface="Consolas" panose="020B0609020204030204" pitchFamily="49" charset="0"/>
-                  <a:cs typeface="Consolas" panose="020B0609020204030204" pitchFamily="49" charset="0"/>
-                </a:rPr>
-                <a:t>bool converged=false</a:t>
+                <a:t>gaze-&gt;</a:t>
+              </a:r>
+              <a:r>
+                <a:rPr lang="pt-BR" b="1" dirty="0" smtClean="0">
+                  <a:latin typeface="Consolas" panose="020B0609020204030204" pitchFamily="49" charset="0"/>
+                  <a:cs typeface="Consolas" panose="020B0609020204030204" pitchFamily="49" charset="0"/>
+                </a:rPr>
+                <a:t>lookAtFixationPoint</a:t>
               </a:r>
               <a:r>
                 <a:rPr lang="pt-BR" dirty="0" smtClean="0">
                   <a:latin typeface="Consolas" panose="020B0609020204030204" pitchFamily="49" charset="0"/>
                   <a:cs typeface="Consolas" panose="020B0609020204030204" pitchFamily="49" charset="0"/>
                 </a:rPr>
-                <a:t>;</a:t>
-              </a:r>
-            </a:p>
-            <a:p>
-              <a:endParaRPr lang="pt-BR" dirty="0">
-                <a:latin typeface="Consolas" panose="020B0609020204030204" pitchFamily="49" charset="0"/>
-                <a:cs typeface="Consolas" panose="020B0609020204030204" pitchFamily="49" charset="0"/>
-              </a:endParaRPr>
-            </a:p>
-            <a:p>
-              <a:r>
-                <a:rPr lang="pt-BR" dirty="0">
-                  <a:latin typeface="Consolas" panose="020B0609020204030204" pitchFamily="49" charset="0"/>
-                  <a:cs typeface="Consolas" panose="020B0609020204030204" pitchFamily="49" charset="0"/>
-                </a:rPr>
-                <a:t>while (!</a:t>
-              </a:r>
-              <a:r>
-                <a:rPr lang="pt-BR" b="1" dirty="0">
-                  <a:latin typeface="Consolas" panose="020B0609020204030204" pitchFamily="49" charset="0"/>
-                  <a:cs typeface="Consolas" panose="020B0609020204030204" pitchFamily="49" charset="0"/>
-                </a:rPr>
-                <a:t>converged</a:t>
-              </a:r>
-              <a:r>
-                <a:rPr lang="pt-BR" dirty="0" smtClean="0">
-                  <a:latin typeface="Consolas" panose="020B0609020204030204" pitchFamily="49" charset="0"/>
-                  <a:cs typeface="Consolas" panose="020B0609020204030204" pitchFamily="49" charset="0"/>
-                </a:rPr>
-                <a:t>) {</a:t>
-              </a:r>
-            </a:p>
-            <a:p>
-              <a:r>
-                <a:rPr lang="pt-BR" dirty="0">
-                  <a:latin typeface="Consolas" panose="020B0609020204030204" pitchFamily="49" charset="0"/>
-                  <a:cs typeface="Consolas" panose="020B0609020204030204" pitchFamily="49" charset="0"/>
-                </a:rPr>
-                <a:t>	</a:t>
-              </a:r>
-              <a:r>
-                <a:rPr lang="pt-BR" dirty="0" smtClean="0">
-                  <a:latin typeface="Consolas" panose="020B0609020204030204" pitchFamily="49" charset="0"/>
-                  <a:cs typeface="Consolas" panose="020B0609020204030204" pitchFamily="49" charset="0"/>
-                </a:rPr>
-                <a:t>Vector pxl(2),pxr(2);</a:t>
-              </a:r>
-              <a:endParaRPr lang="pt-BR" dirty="0">
-                <a:latin typeface="Consolas" panose="020B0609020204030204" pitchFamily="49" charset="0"/>
-                <a:cs typeface="Consolas" panose="020B0609020204030204" pitchFamily="49" charset="0"/>
-              </a:endParaRPr>
-            </a:p>
-            <a:p>
-              <a:r>
-                <a:rPr lang="pt-BR" dirty="0">
-                  <a:latin typeface="Consolas" panose="020B0609020204030204" pitchFamily="49" charset="0"/>
-                  <a:cs typeface="Consolas" panose="020B0609020204030204" pitchFamily="49" charset="0"/>
-                </a:rPr>
-                <a:t>    pxl[0</a:t>
-              </a:r>
-              <a:r>
-                <a:rPr lang="pt-BR" dirty="0" smtClean="0">
-                  <a:latin typeface="Consolas" panose="020B0609020204030204" pitchFamily="49" charset="0"/>
-                  <a:cs typeface="Consolas" panose="020B0609020204030204" pitchFamily="49" charset="0"/>
-                </a:rPr>
-                <a:t>]=...; </a:t>
-              </a:r>
-              <a:r>
-                <a:rPr lang="pt-BR" dirty="0">
-                  <a:latin typeface="Consolas" panose="020B0609020204030204" pitchFamily="49" charset="0"/>
-                  <a:cs typeface="Consolas" panose="020B0609020204030204" pitchFamily="49" charset="0"/>
-                </a:rPr>
-                <a:t>pxl[1</a:t>
-              </a:r>
-              <a:r>
-                <a:rPr lang="pt-BR" dirty="0" smtClean="0">
-                  <a:latin typeface="Consolas" panose="020B0609020204030204" pitchFamily="49" charset="0"/>
-                  <a:cs typeface="Consolas" panose="020B0609020204030204" pitchFamily="49" charset="0"/>
-                </a:rPr>
-                <a:t>]=...;	</a:t>
-              </a:r>
-              <a:r>
-                <a:rPr lang="pt-BR" i="1" dirty="0" smtClean="0">
-                  <a:solidFill>
-                    <a:srgbClr val="00B050"/>
-                  </a:solidFill>
-                  <a:latin typeface="Consolas" panose="020B0609020204030204" pitchFamily="49" charset="0"/>
-                  <a:cs typeface="Consolas" panose="020B0609020204030204" pitchFamily="49" charset="0"/>
-                </a:rPr>
-                <a:t>// retrieve data from vision</a:t>
-              </a:r>
-              <a:endParaRPr lang="pt-BR" i="1" dirty="0">
-                <a:solidFill>
-                  <a:srgbClr val="00B050"/>
-                </a:solidFill>
-                <a:latin typeface="Consolas" panose="020B0609020204030204" pitchFamily="49" charset="0"/>
-                <a:cs typeface="Consolas" panose="020B0609020204030204" pitchFamily="49" charset="0"/>
-              </a:endParaRPr>
-            </a:p>
-            <a:p>
-              <a:r>
-                <a:rPr lang="pt-BR" dirty="0">
-                  <a:latin typeface="Consolas" panose="020B0609020204030204" pitchFamily="49" charset="0"/>
-                  <a:cs typeface="Consolas" panose="020B0609020204030204" pitchFamily="49" charset="0"/>
-                </a:rPr>
-                <a:t>    pxr[0</a:t>
-              </a:r>
-              <a:r>
-                <a:rPr lang="pt-BR" dirty="0" smtClean="0">
-                  <a:latin typeface="Consolas" panose="020B0609020204030204" pitchFamily="49" charset="0"/>
-                  <a:cs typeface="Consolas" panose="020B0609020204030204" pitchFamily="49" charset="0"/>
-                </a:rPr>
-                <a:t>]=...; </a:t>
-              </a:r>
-              <a:r>
-                <a:rPr lang="pt-BR" dirty="0">
-                  <a:latin typeface="Consolas" panose="020B0609020204030204" pitchFamily="49" charset="0"/>
-                  <a:cs typeface="Consolas" panose="020B0609020204030204" pitchFamily="49" charset="0"/>
-                </a:rPr>
-                <a:t>pxr[1</a:t>
-              </a:r>
-              <a:r>
-                <a:rPr lang="pt-BR" dirty="0" smtClean="0">
-                  <a:latin typeface="Consolas" panose="020B0609020204030204" pitchFamily="49" charset="0"/>
-                  <a:cs typeface="Consolas" panose="020B0609020204030204" pitchFamily="49" charset="0"/>
-                </a:rPr>
-                <a:t>]=...;</a:t>
-              </a:r>
-            </a:p>
-            <a:p>
-              <a:endParaRPr lang="pt-BR" dirty="0">
-                <a:latin typeface="Consolas" panose="020B0609020204030204" pitchFamily="49" charset="0"/>
-                <a:cs typeface="Consolas" panose="020B0609020204030204" pitchFamily="49" charset="0"/>
-              </a:endParaRPr>
-            </a:p>
-            <a:p>
-              <a:r>
-                <a:rPr lang="pt-BR" dirty="0">
-                  <a:latin typeface="Consolas" panose="020B0609020204030204" pitchFamily="49" charset="0"/>
-                  <a:cs typeface="Consolas" panose="020B0609020204030204" pitchFamily="49" charset="0"/>
-                </a:rPr>
-                <a:t>    igaze-&gt;</a:t>
-              </a:r>
-              <a:r>
-                <a:rPr lang="pt-BR" b="1" dirty="0">
-                  <a:latin typeface="Consolas" panose="020B0609020204030204" pitchFamily="49" charset="0"/>
-                  <a:cs typeface="Consolas" panose="020B0609020204030204" pitchFamily="49" charset="0"/>
-                </a:rPr>
-                <a:t>lookAtStereoPixels</a:t>
-              </a:r>
-              <a:r>
-                <a:rPr lang="pt-BR" dirty="0">
-                  <a:latin typeface="Consolas" panose="020B0609020204030204" pitchFamily="49" charset="0"/>
-                  <a:cs typeface="Consolas" panose="020B0609020204030204" pitchFamily="49" charset="0"/>
-                </a:rPr>
-                <a:t>(pxl,pxr</a:t>
-              </a:r>
-              <a:r>
-                <a:rPr lang="pt-BR" dirty="0" smtClean="0">
-                  <a:latin typeface="Consolas" panose="020B0609020204030204" pitchFamily="49" charset="0"/>
-                  <a:cs typeface="Consolas" panose="020B0609020204030204" pitchFamily="49" charset="0"/>
-                </a:rPr>
-                <a:t>);</a:t>
-              </a:r>
-              <a:endParaRPr lang="pt-BR" dirty="0">
-                <a:latin typeface="Consolas" panose="020B0609020204030204" pitchFamily="49" charset="0"/>
-                <a:cs typeface="Consolas" panose="020B0609020204030204" pitchFamily="49" charset="0"/>
-              </a:endParaRPr>
-            </a:p>
-            <a:p>
-              <a:r>
-                <a:rPr lang="pt-BR" dirty="0">
-                  <a:latin typeface="Consolas" panose="020B0609020204030204" pitchFamily="49" charset="0"/>
-                  <a:cs typeface="Consolas" panose="020B0609020204030204" pitchFamily="49" charset="0"/>
-                </a:rPr>
-                <a:t>    converged=(0.5*(norm(c-pxl)+norm(c-pxr))&lt;5</a:t>
-              </a:r>
-              <a:r>
-                <a:rPr lang="pt-BR" dirty="0" smtClean="0">
-                  <a:latin typeface="Consolas" panose="020B0609020204030204" pitchFamily="49" charset="0"/>
-                  <a:cs typeface="Consolas" panose="020B0609020204030204" pitchFamily="49" charset="0"/>
-                </a:rPr>
-                <a:t>);</a:t>
-              </a:r>
-              <a:endParaRPr lang="pt-BR" dirty="0">
-                <a:latin typeface="Consolas" panose="020B0609020204030204" pitchFamily="49" charset="0"/>
-                <a:cs typeface="Consolas" panose="020B0609020204030204" pitchFamily="49" charset="0"/>
-              </a:endParaRPr>
-            </a:p>
-            <a:p>
-              <a:r>
-                <a:rPr lang="pt-BR" dirty="0">
-                  <a:latin typeface="Consolas" panose="020B0609020204030204" pitchFamily="49" charset="0"/>
-                  <a:cs typeface="Consolas" panose="020B0609020204030204" pitchFamily="49" charset="0"/>
-                </a:rPr>
-                <a:t>}</a:t>
-              </a:r>
-              <a:endParaRPr lang="pt-BR" dirty="0" smtClean="0">
-                <a:latin typeface="Consolas" panose="020B0609020204030204" pitchFamily="49" charset="0"/>
-                <a:cs typeface="Consolas" panose="020B0609020204030204" pitchFamily="49" charset="0"/>
-              </a:endParaRPr>
+                <a:t>(x);</a:t>
+              </a:r>
             </a:p>
           </p:txBody>
         </p:sp>
         <p:sp>
           <p:nvSpPr>
-            <p:cNvPr id="15" name="TextBox 14"/>
+            <p:cNvPr id="20" name="TextBox 19"/>
             <p:cNvSpPr txBox="1"/>
             <p:nvPr/>
           </p:nvSpPr>
           <p:spPr>
             <a:xfrm>
               <a:off x="508725" y="1174123"/>
-              <a:ext cx="6032357" cy="400110"/>
+              <a:ext cx="2131481" cy="400110"/>
             </a:xfrm>
             <a:prstGeom prst="rect">
               <a:avLst/>
@@ -12082,17 +11769,65 @@
             <a:p>
               <a:r>
                 <a:rPr lang="en-GB" sz="2000" b="1" dirty="0" smtClean="0"/>
-                <a:t>LOOK AT POINT WITH STEREO APPROACH =&gt; LOOPING!</a:t>
+                <a:t>… EQUIVALENT TO</a:t>
               </a:r>
               <a:endParaRPr lang="en-GB" sz="2000" b="1" dirty="0"/>
             </a:p>
           </p:txBody>
         </p:sp>
       </p:grpSp>
+      <p:sp>
+        <p:nvSpPr>
+          <p:cNvPr id="3" name="Equal 2"/>
+          <p:cNvSpPr/>
+          <p:nvPr/>
+        </p:nvSpPr>
+        <p:spPr>
+          <a:xfrm>
+            <a:off x="4247617" y="3843944"/>
+            <a:ext cx="759125" cy="671154"/>
+          </a:xfrm>
+          <a:prstGeom prst="mathEqual">
+            <a:avLst>
+              <a:gd name="adj1" fmla="val 23520"/>
+              <a:gd name="adj2" fmla="val 11760"/>
+            </a:avLst>
+          </a:prstGeom>
+          <a:solidFill>
+            <a:srgbClr val="00B0F0"/>
+          </a:solidFill>
+        </p:spPr>
+        <p:style>
+          <a:lnRef idx="1">
+            <a:schemeClr val="accent1"/>
+          </a:lnRef>
+          <a:fillRef idx="3">
+            <a:schemeClr val="accent1"/>
+          </a:fillRef>
+          <a:effectRef idx="2">
+            <a:schemeClr val="accent1"/>
+          </a:effectRef>
+          <a:fontRef idx="minor">
+            <a:schemeClr val="lt1"/>
+          </a:fontRef>
+        </p:style>
+        <p:txBody>
+          <a:bodyPr rtlCol="0" anchor="ctr"/>
+          <a:lstStyle/>
+          <a:p>
+            <a:pPr algn="ctr"/>
+            <a:endParaRPr lang="en-GB">
+              <a:solidFill>
+                <a:schemeClr val="tx1"/>
+              </a:solidFill>
+            </a:endParaRPr>
+          </a:p>
+        </p:txBody>
+      </p:sp>
     </p:spTree>
     <p:extLst>
       <p:ext uri="{BB962C8B-B14F-4D97-AF65-F5344CB8AC3E}">
-        <p14:creationId xmlns:p14="http://schemas.microsoft.com/office/powerpoint/2010/main" val="3028852404"/>
+        <p14:creationId xmlns:p14="http://schemas.microsoft.com/office/powerpoint/2010/main" val="3414937765"/>
       </p:ext>
     </p:extLst>
   </p:cSld>
@@ -12159,12 +11894,963 @@
             </a:r>
             <a:r>
               <a:rPr lang="en-US" sz="2800" b="1" dirty="0" smtClean="0"/>
-              <a:t>(4/4</a:t>
+              <a:t>(4/6)</a:t>
+            </a:r>
+            <a:endParaRPr lang="en-US" sz="2800" b="1" dirty="0"/>
+          </a:p>
+        </p:txBody>
+      </p:sp>
+      <p:grpSp>
+        <p:nvGrpSpPr>
+          <p:cNvPr id="9" name="Group 8"/>
+          <p:cNvGrpSpPr/>
+          <p:nvPr/>
+        </p:nvGrpSpPr>
+        <p:grpSpPr>
+          <a:xfrm>
+            <a:off x="508725" y="1170923"/>
+            <a:ext cx="8199846" cy="1521177"/>
+            <a:chOff x="508725" y="1174123"/>
+            <a:chExt cx="8199846" cy="1521177"/>
+          </a:xfrm>
+        </p:grpSpPr>
+        <p:sp>
+          <p:nvSpPr>
+            <p:cNvPr id="10" name="TextBox 9"/>
+            <p:cNvSpPr txBox="1"/>
+            <p:nvPr/>
+          </p:nvSpPr>
+          <p:spPr>
+            <a:xfrm>
+              <a:off x="551543" y="1494971"/>
+              <a:ext cx="8157028" cy="1200329"/>
+            </a:xfrm>
+            <a:prstGeom prst="rect">
+              <a:avLst/>
+            </a:prstGeom>
+            <a:solidFill>
+              <a:schemeClr val="accent5">
+                <a:lumMod val="20000"/>
+                <a:lumOff val="80000"/>
+                <a:alpha val="50000"/>
+              </a:schemeClr>
+            </a:solidFill>
+            <a:ln w="12700">
+              <a:solidFill>
+                <a:schemeClr val="accent5"/>
+              </a:solidFill>
+            </a:ln>
+          </p:spPr>
+          <p:txBody>
+            <a:bodyPr wrap="square" rtlCol="0">
+              <a:spAutoFit/>
+            </a:bodyPr>
+            <a:lstStyle/>
+            <a:p>
+              <a:r>
+                <a:rPr lang="pt-BR" dirty="0" smtClean="0">
+                  <a:latin typeface="Consolas" panose="020B0609020204030204" pitchFamily="49" charset="0"/>
+                  <a:cs typeface="Consolas" panose="020B0609020204030204" pitchFamily="49" charset="0"/>
+                </a:rPr>
+                <a:t>Vector x;</a:t>
+              </a:r>
+            </a:p>
+            <a:p>
+              <a:r>
+                <a:rPr lang="pt-BR" dirty="0" smtClean="0">
+                  <a:latin typeface="Consolas" panose="020B0609020204030204" pitchFamily="49" charset="0"/>
+                  <a:cs typeface="Consolas" panose="020B0609020204030204" pitchFamily="49" charset="0"/>
+                </a:rPr>
+                <a:t>igaze-&gt;</a:t>
+              </a:r>
+              <a:r>
+                <a:rPr lang="pt-BR" b="1" dirty="0" smtClean="0">
+                  <a:latin typeface="Consolas" panose="020B0609020204030204" pitchFamily="49" charset="0"/>
+                  <a:cs typeface="Consolas" panose="020B0609020204030204" pitchFamily="49" charset="0"/>
+                </a:rPr>
+                <a:t>get3DPointOnPlane</a:t>
+              </a:r>
+              <a:r>
+                <a:rPr lang="pt-BR" dirty="0" smtClean="0">
+                  <a:latin typeface="Consolas" panose="020B0609020204030204" pitchFamily="49" charset="0"/>
+                  <a:cs typeface="Consolas" panose="020B0609020204030204" pitchFamily="49" charset="0"/>
+                </a:rPr>
+                <a:t>(camSel,px,plane,x);</a:t>
+              </a:r>
+            </a:p>
+            <a:p>
+              <a:r>
+                <a:rPr lang="pt-BR" dirty="0" smtClean="0">
+                  <a:latin typeface="Consolas" panose="020B0609020204030204" pitchFamily="49" charset="0"/>
+                  <a:cs typeface="Consolas" panose="020B0609020204030204" pitchFamily="49" charset="0"/>
+                </a:rPr>
+                <a:t>igaze-</a:t>
+              </a:r>
+              <a:r>
+                <a:rPr lang="pt-BR" dirty="0">
+                  <a:latin typeface="Consolas" panose="020B0609020204030204" pitchFamily="49" charset="0"/>
+                  <a:cs typeface="Consolas" panose="020B0609020204030204" pitchFamily="49" charset="0"/>
+                </a:rPr>
+                <a:t>&gt;</a:t>
+              </a:r>
+              <a:r>
+                <a:rPr lang="pt-BR" b="1" dirty="0" smtClean="0">
+                  <a:latin typeface="Consolas" panose="020B0609020204030204" pitchFamily="49" charset="0"/>
+                  <a:cs typeface="Consolas" panose="020B0609020204030204" pitchFamily="49" charset="0"/>
+                </a:rPr>
+                <a:t>get3DPointFromAngles</a:t>
+              </a:r>
+              <a:r>
+                <a:rPr lang="pt-BR" dirty="0" smtClean="0">
+                  <a:latin typeface="Consolas" panose="020B0609020204030204" pitchFamily="49" charset="0"/>
+                  <a:cs typeface="Consolas" panose="020B0609020204030204" pitchFamily="49" charset="0"/>
+                </a:rPr>
+                <a:t>(mode,ang,x);</a:t>
+              </a:r>
+            </a:p>
+            <a:p>
+              <a:r>
+                <a:rPr lang="pt-BR" dirty="0" smtClean="0">
+                  <a:latin typeface="Consolas" panose="020B0609020204030204" pitchFamily="49" charset="0"/>
+                  <a:cs typeface="Consolas" panose="020B0609020204030204" pitchFamily="49" charset="0"/>
+                </a:rPr>
+                <a:t>igaze-&gt;</a:t>
+              </a:r>
+              <a:r>
+                <a:rPr lang="pt-BR" b="1" dirty="0" smtClean="0">
+                  <a:latin typeface="Consolas" panose="020B0609020204030204" pitchFamily="49" charset="0"/>
+                  <a:cs typeface="Consolas" panose="020B0609020204030204" pitchFamily="49" charset="0"/>
+                </a:rPr>
+                <a:t>triangulate3DPoint</a:t>
+              </a:r>
+              <a:r>
+                <a:rPr lang="pt-BR" dirty="0" smtClean="0">
+                  <a:latin typeface="Consolas" panose="020B0609020204030204" pitchFamily="49" charset="0"/>
+                  <a:cs typeface="Consolas" panose="020B0609020204030204" pitchFamily="49" charset="0"/>
+                </a:rPr>
+                <a:t>(pxl,pxr,x);</a:t>
+              </a:r>
+            </a:p>
+          </p:txBody>
+        </p:sp>
+        <p:sp>
+          <p:nvSpPr>
+            <p:cNvPr id="11" name="TextBox 10"/>
+            <p:cNvSpPr txBox="1"/>
+            <p:nvPr/>
+          </p:nvSpPr>
+          <p:spPr>
+            <a:xfrm>
+              <a:off x="508725" y="1174123"/>
+              <a:ext cx="2498313" cy="400110"/>
+            </a:xfrm>
+            <a:prstGeom prst="rect">
+              <a:avLst/>
+            </a:prstGeom>
+            <a:noFill/>
+          </p:spPr>
+          <p:txBody>
+            <a:bodyPr wrap="none" rtlCol="0">
+              <a:spAutoFit/>
+            </a:bodyPr>
+            <a:lstStyle/>
+            <a:p>
+              <a:r>
+                <a:rPr lang="en-GB" sz="2000" b="1" dirty="0" smtClean="0"/>
+                <a:t>GEOMETRY OF PIXELS</a:t>
+              </a:r>
+              <a:endParaRPr lang="en-GB" sz="2000" b="1" dirty="0"/>
+            </a:p>
+          </p:txBody>
+        </p:sp>
+      </p:grpSp>
+      <p:pic>
+        <p:nvPicPr>
+          <p:cNvPr id="2" name="Picture 1"/>
+          <p:cNvPicPr>
+            <a:picLocks noChangeAspect="1"/>
+          </p:cNvPicPr>
+          <p:nvPr/>
+        </p:nvPicPr>
+        <p:blipFill>
+          <a:blip r:embed="rId3">
+            <a:extLst>
+              <a:ext uri="{28A0092B-C50C-407E-A947-70E740481C1C}">
+                <a14:useLocalDpi xmlns:a14="http://schemas.microsoft.com/office/drawing/2010/main" val="0"/>
+              </a:ext>
+            </a:extLst>
+          </a:blip>
+          <a:stretch>
+            <a:fillRect/>
+          </a:stretch>
+        </p:blipFill>
+        <p:spPr>
+          <a:xfrm>
+            <a:off x="2111009" y="2852520"/>
+            <a:ext cx="5038095" cy="3580952"/>
+          </a:xfrm>
+          <a:prstGeom prst="rect">
+            <a:avLst/>
+          </a:prstGeom>
+        </p:spPr>
+      </p:pic>
+    </p:spTree>
+    <p:extLst>
+      <p:ext uri="{BB962C8B-B14F-4D97-AF65-F5344CB8AC3E}">
+        <p14:creationId xmlns:p14="http://schemas.microsoft.com/office/powerpoint/2010/main" val="3028852404"/>
+      </p:ext>
+    </p:extLst>
+  </p:cSld>
+  <p:clrMapOvr>
+    <a:masterClrMapping/>
+  </p:clrMapOvr>
+  <p:timing>
+    <p:tnLst>
+      <p:par>
+        <p:cTn id="1" dur="indefinite" restart="never" nodeType="tmRoot"/>
+      </p:par>
+    </p:tnLst>
+  </p:timing>
+</p:sld>
+</file>
+
+<file path=ppt/slides/slide29.xml><?xml version="1.0" encoding="utf-8"?>
+<p:sld xmlns:a="http://schemas.openxmlformats.org/drawingml/2006/main" xmlns:r="http://schemas.openxmlformats.org/officeDocument/2006/relationships" xmlns:p="http://schemas.openxmlformats.org/presentationml/2006/main">
+  <p:cSld>
+    <p:spTree>
+      <p:nvGrpSpPr>
+        <p:cNvPr id="1" name=""/>
+        <p:cNvGrpSpPr/>
+        <p:nvPr/>
+      </p:nvGrpSpPr>
+      <p:grpSpPr>
+        <a:xfrm>
+          <a:off x="0" y="0"/>
+          <a:ext cx="0" cy="0"/>
+          <a:chOff x="0" y="0"/>
+          <a:chExt cx="0" cy="0"/>
+        </a:xfrm>
+      </p:grpSpPr>
+      <p:sp>
+        <p:nvSpPr>
+          <p:cNvPr id="7" name="TextBox 6"/>
+          <p:cNvSpPr txBox="1"/>
+          <p:nvPr/>
+        </p:nvSpPr>
+        <p:spPr>
+          <a:xfrm>
+            <a:off x="1475656" y="457508"/>
+            <a:ext cx="6480720" cy="523220"/>
+          </a:xfrm>
+          <a:prstGeom prst="rect">
+            <a:avLst/>
+          </a:prstGeom>
+          <a:noFill/>
+        </p:spPr>
+        <p:txBody>
+          <a:bodyPr wrap="square" rtlCol="0">
+            <a:spAutoFit/>
+          </a:bodyPr>
+          <a:lstStyle/>
+          <a:p>
+            <a:pPr algn="ctr"/>
+            <a:r>
+              <a:rPr lang="en-US" sz="2800" b="1" dirty="0" smtClean="0"/>
+              <a:t>Gaze</a:t>
             </a:r>
             <a:r>
               <a:rPr lang="en-US" sz="2800" b="1" dirty="0"/>
-              <a:t>)</a:t>
-            </a:r>
+              <a:t> Interface </a:t>
+            </a:r>
+            <a:r>
+              <a:rPr lang="en-US" sz="2800" b="1" dirty="0" smtClean="0"/>
+              <a:t>(5/6)</a:t>
+            </a:r>
+            <a:endParaRPr lang="en-US" sz="2800" b="1" dirty="0"/>
+          </a:p>
+        </p:txBody>
+      </p:sp>
+      <p:grpSp>
+        <p:nvGrpSpPr>
+          <p:cNvPr id="9" name="Group 8"/>
+          <p:cNvGrpSpPr/>
+          <p:nvPr/>
+        </p:nvGrpSpPr>
+        <p:grpSpPr>
+          <a:xfrm>
+            <a:off x="508725" y="1170923"/>
+            <a:ext cx="8199846" cy="1521177"/>
+            <a:chOff x="508725" y="1174123"/>
+            <a:chExt cx="8199846" cy="1521177"/>
+          </a:xfrm>
+        </p:grpSpPr>
+        <p:sp>
+          <p:nvSpPr>
+            <p:cNvPr id="10" name="TextBox 9"/>
+            <p:cNvSpPr txBox="1"/>
+            <p:nvPr/>
+          </p:nvSpPr>
+          <p:spPr>
+            <a:xfrm>
+              <a:off x="551543" y="1494971"/>
+              <a:ext cx="8157028" cy="1200329"/>
+            </a:xfrm>
+            <a:prstGeom prst="rect">
+              <a:avLst/>
+            </a:prstGeom>
+            <a:solidFill>
+              <a:schemeClr val="accent5">
+                <a:lumMod val="20000"/>
+                <a:lumOff val="80000"/>
+                <a:alpha val="50000"/>
+              </a:schemeClr>
+            </a:solidFill>
+            <a:ln w="12700">
+              <a:solidFill>
+                <a:schemeClr val="accent5"/>
+              </a:solidFill>
+            </a:ln>
+          </p:spPr>
+          <p:txBody>
+            <a:bodyPr wrap="square" rtlCol="0">
+              <a:spAutoFit/>
+            </a:bodyPr>
+            <a:lstStyle/>
+            <a:p>
+              <a:r>
+                <a:rPr lang="pt-BR" dirty="0" smtClean="0">
+                  <a:latin typeface="Consolas" panose="020B0609020204030204" pitchFamily="49" charset="0"/>
+                  <a:cs typeface="Consolas" panose="020B0609020204030204" pitchFamily="49" charset="0"/>
+                </a:rPr>
+                <a:t>Vector x;</a:t>
+              </a:r>
+            </a:p>
+            <a:p>
+              <a:r>
+                <a:rPr lang="pt-BR" dirty="0" smtClean="0">
+                  <a:latin typeface="Consolas" panose="020B0609020204030204" pitchFamily="49" charset="0"/>
+                  <a:cs typeface="Consolas" panose="020B0609020204030204" pitchFamily="49" charset="0"/>
+                </a:rPr>
+                <a:t>igaze-&gt;</a:t>
+              </a:r>
+              <a:r>
+                <a:rPr lang="pt-BR" b="1" dirty="0" smtClean="0">
+                  <a:latin typeface="Consolas" panose="020B0609020204030204" pitchFamily="49" charset="0"/>
+                  <a:cs typeface="Consolas" panose="020B0609020204030204" pitchFamily="49" charset="0"/>
+                </a:rPr>
+                <a:t>get3DPointOnPlane</a:t>
+              </a:r>
+              <a:r>
+                <a:rPr lang="pt-BR" dirty="0" smtClean="0">
+                  <a:latin typeface="Consolas" panose="020B0609020204030204" pitchFamily="49" charset="0"/>
+                  <a:cs typeface="Consolas" panose="020B0609020204030204" pitchFamily="49" charset="0"/>
+                </a:rPr>
+                <a:t>(camSel,px,plane,x);</a:t>
+              </a:r>
+            </a:p>
+            <a:p>
+              <a:r>
+                <a:rPr lang="pt-BR" dirty="0" smtClean="0">
+                  <a:latin typeface="Consolas" panose="020B0609020204030204" pitchFamily="49" charset="0"/>
+                  <a:cs typeface="Consolas" panose="020B0609020204030204" pitchFamily="49" charset="0"/>
+                </a:rPr>
+                <a:t>igaze-</a:t>
+              </a:r>
+              <a:r>
+                <a:rPr lang="pt-BR" dirty="0">
+                  <a:latin typeface="Consolas" panose="020B0609020204030204" pitchFamily="49" charset="0"/>
+                  <a:cs typeface="Consolas" panose="020B0609020204030204" pitchFamily="49" charset="0"/>
+                </a:rPr>
+                <a:t>&gt;</a:t>
+              </a:r>
+              <a:r>
+                <a:rPr lang="pt-BR" b="1" dirty="0" smtClean="0">
+                  <a:latin typeface="Consolas" panose="020B0609020204030204" pitchFamily="49" charset="0"/>
+                  <a:cs typeface="Consolas" panose="020B0609020204030204" pitchFamily="49" charset="0"/>
+                </a:rPr>
+                <a:t>get3DPointFromAngles</a:t>
+              </a:r>
+              <a:r>
+                <a:rPr lang="pt-BR" dirty="0" smtClean="0">
+                  <a:latin typeface="Consolas" panose="020B0609020204030204" pitchFamily="49" charset="0"/>
+                  <a:cs typeface="Consolas" panose="020B0609020204030204" pitchFamily="49" charset="0"/>
+                </a:rPr>
+                <a:t>(mode,ang,x);</a:t>
+              </a:r>
+            </a:p>
+            <a:p>
+              <a:r>
+                <a:rPr lang="pt-BR" dirty="0" smtClean="0">
+                  <a:latin typeface="Consolas" panose="020B0609020204030204" pitchFamily="49" charset="0"/>
+                  <a:cs typeface="Consolas" panose="020B0609020204030204" pitchFamily="49" charset="0"/>
+                </a:rPr>
+                <a:t>igaze-&gt;</a:t>
+              </a:r>
+              <a:r>
+                <a:rPr lang="pt-BR" b="1" dirty="0" smtClean="0">
+                  <a:latin typeface="Consolas" panose="020B0609020204030204" pitchFamily="49" charset="0"/>
+                  <a:cs typeface="Consolas" panose="020B0609020204030204" pitchFamily="49" charset="0"/>
+                </a:rPr>
+                <a:t>triangulate3DPoint</a:t>
+              </a:r>
+              <a:r>
+                <a:rPr lang="pt-BR" dirty="0" smtClean="0">
+                  <a:latin typeface="Consolas" panose="020B0609020204030204" pitchFamily="49" charset="0"/>
+                  <a:cs typeface="Consolas" panose="020B0609020204030204" pitchFamily="49" charset="0"/>
+                </a:rPr>
+                <a:t>(pxl,pxr,x);</a:t>
+              </a:r>
+            </a:p>
+          </p:txBody>
+        </p:sp>
+        <p:sp>
+          <p:nvSpPr>
+            <p:cNvPr id="11" name="TextBox 10"/>
+            <p:cNvSpPr txBox="1"/>
+            <p:nvPr/>
+          </p:nvSpPr>
+          <p:spPr>
+            <a:xfrm>
+              <a:off x="508725" y="1174123"/>
+              <a:ext cx="2498313" cy="400110"/>
+            </a:xfrm>
+            <a:prstGeom prst="rect">
+              <a:avLst/>
+            </a:prstGeom>
+            <a:noFill/>
+          </p:spPr>
+          <p:txBody>
+            <a:bodyPr wrap="none" rtlCol="0">
+              <a:spAutoFit/>
+            </a:bodyPr>
+            <a:lstStyle/>
+            <a:p>
+              <a:r>
+                <a:rPr lang="en-GB" sz="2000" b="1" dirty="0" smtClean="0"/>
+                <a:t>GEOMETRY OF PIXELS</a:t>
+              </a:r>
+              <a:endParaRPr lang="en-GB" sz="2000" b="1" dirty="0"/>
+            </a:p>
+          </p:txBody>
+        </p:sp>
+      </p:grpSp>
+      <p:grpSp>
+        <p:nvGrpSpPr>
+          <p:cNvPr id="13" name="Group 12"/>
+          <p:cNvGrpSpPr/>
+          <p:nvPr/>
+        </p:nvGrpSpPr>
+        <p:grpSpPr>
+          <a:xfrm>
+            <a:off x="505848" y="2927828"/>
+            <a:ext cx="8199846" cy="3460169"/>
+            <a:chOff x="508725" y="1174123"/>
+            <a:chExt cx="8199846" cy="3460169"/>
+          </a:xfrm>
+        </p:grpSpPr>
+        <p:sp>
+          <p:nvSpPr>
+            <p:cNvPr id="14" name="TextBox 13"/>
+            <p:cNvSpPr txBox="1"/>
+            <p:nvPr/>
+          </p:nvSpPr>
+          <p:spPr>
+            <a:xfrm>
+              <a:off x="551543" y="1494971"/>
+              <a:ext cx="8157028" cy="3139321"/>
+            </a:xfrm>
+            <a:prstGeom prst="rect">
+              <a:avLst/>
+            </a:prstGeom>
+            <a:solidFill>
+              <a:schemeClr val="accent5">
+                <a:lumMod val="20000"/>
+                <a:lumOff val="80000"/>
+                <a:alpha val="50000"/>
+              </a:schemeClr>
+            </a:solidFill>
+            <a:ln w="12700">
+              <a:solidFill>
+                <a:schemeClr val="accent5"/>
+              </a:solidFill>
+            </a:ln>
+          </p:spPr>
+          <p:txBody>
+            <a:bodyPr wrap="square" rtlCol="0">
+              <a:spAutoFit/>
+            </a:bodyPr>
+            <a:lstStyle/>
+            <a:p>
+              <a:r>
+                <a:rPr lang="pt-BR" dirty="0">
+                  <a:latin typeface="Consolas" panose="020B0609020204030204" pitchFamily="49" charset="0"/>
+                  <a:cs typeface="Consolas" panose="020B0609020204030204" pitchFamily="49" charset="0"/>
+                </a:rPr>
+                <a:t>Vector c(2</a:t>
+              </a:r>
+              <a:r>
+                <a:rPr lang="pt-BR" dirty="0" smtClean="0">
+                  <a:latin typeface="Consolas" panose="020B0609020204030204" pitchFamily="49" charset="0"/>
+                  <a:cs typeface="Consolas" panose="020B0609020204030204" pitchFamily="49" charset="0"/>
+                </a:rPr>
+                <a:t>); c[0</a:t>
+              </a:r>
+              <a:r>
+                <a:rPr lang="pt-BR" dirty="0">
+                  <a:latin typeface="Consolas" panose="020B0609020204030204" pitchFamily="49" charset="0"/>
+                  <a:cs typeface="Consolas" panose="020B0609020204030204" pitchFamily="49" charset="0"/>
+                </a:rPr>
+                <a:t>]=</a:t>
+              </a:r>
+              <a:r>
+                <a:rPr lang="pt-BR" dirty="0" smtClean="0">
+                  <a:latin typeface="Consolas" panose="020B0609020204030204" pitchFamily="49" charset="0"/>
+                  <a:cs typeface="Consolas" panose="020B0609020204030204" pitchFamily="49" charset="0"/>
+                </a:rPr>
+                <a:t>160.0; c[1</a:t>
+              </a:r>
+              <a:r>
+                <a:rPr lang="pt-BR" dirty="0">
+                  <a:latin typeface="Consolas" panose="020B0609020204030204" pitchFamily="49" charset="0"/>
+                  <a:cs typeface="Consolas" panose="020B0609020204030204" pitchFamily="49" charset="0"/>
+                </a:rPr>
+                <a:t>]=120.0;</a:t>
+              </a:r>
+            </a:p>
+            <a:p>
+              <a:r>
+                <a:rPr lang="pt-BR" dirty="0">
+                  <a:latin typeface="Consolas" panose="020B0609020204030204" pitchFamily="49" charset="0"/>
+                  <a:cs typeface="Consolas" panose="020B0609020204030204" pitchFamily="49" charset="0"/>
+                </a:rPr>
+                <a:t>bool converged=false</a:t>
+              </a:r>
+              <a:r>
+                <a:rPr lang="pt-BR" dirty="0" smtClean="0">
+                  <a:latin typeface="Consolas" panose="020B0609020204030204" pitchFamily="49" charset="0"/>
+                  <a:cs typeface="Consolas" panose="020B0609020204030204" pitchFamily="49" charset="0"/>
+                </a:rPr>
+                <a:t>;</a:t>
+              </a:r>
+            </a:p>
+            <a:p>
+              <a:endParaRPr lang="pt-BR" dirty="0">
+                <a:latin typeface="Consolas" panose="020B0609020204030204" pitchFamily="49" charset="0"/>
+                <a:cs typeface="Consolas" panose="020B0609020204030204" pitchFamily="49" charset="0"/>
+              </a:endParaRPr>
+            </a:p>
+            <a:p>
+              <a:r>
+                <a:rPr lang="pt-BR" dirty="0">
+                  <a:latin typeface="Consolas" panose="020B0609020204030204" pitchFamily="49" charset="0"/>
+                  <a:cs typeface="Consolas" panose="020B0609020204030204" pitchFamily="49" charset="0"/>
+                </a:rPr>
+                <a:t>while (!</a:t>
+              </a:r>
+              <a:r>
+                <a:rPr lang="pt-BR" b="1" dirty="0">
+                  <a:latin typeface="Consolas" panose="020B0609020204030204" pitchFamily="49" charset="0"/>
+                  <a:cs typeface="Consolas" panose="020B0609020204030204" pitchFamily="49" charset="0"/>
+                </a:rPr>
+                <a:t>converged</a:t>
+              </a:r>
+              <a:r>
+                <a:rPr lang="pt-BR" dirty="0" smtClean="0">
+                  <a:latin typeface="Consolas" panose="020B0609020204030204" pitchFamily="49" charset="0"/>
+                  <a:cs typeface="Consolas" panose="020B0609020204030204" pitchFamily="49" charset="0"/>
+                </a:rPr>
+                <a:t>) {</a:t>
+              </a:r>
+            </a:p>
+            <a:p>
+              <a:r>
+                <a:rPr lang="pt-BR" dirty="0">
+                  <a:latin typeface="Consolas" panose="020B0609020204030204" pitchFamily="49" charset="0"/>
+                  <a:cs typeface="Consolas" panose="020B0609020204030204" pitchFamily="49" charset="0"/>
+                </a:rPr>
+                <a:t>	</a:t>
+              </a:r>
+              <a:r>
+                <a:rPr lang="pt-BR" dirty="0" smtClean="0">
+                  <a:latin typeface="Consolas" panose="020B0609020204030204" pitchFamily="49" charset="0"/>
+                  <a:cs typeface="Consolas" panose="020B0609020204030204" pitchFamily="49" charset="0"/>
+                </a:rPr>
+                <a:t>Vector pxl(2),pxr(2);</a:t>
+              </a:r>
+              <a:endParaRPr lang="pt-BR" dirty="0">
+                <a:latin typeface="Consolas" panose="020B0609020204030204" pitchFamily="49" charset="0"/>
+                <a:cs typeface="Consolas" panose="020B0609020204030204" pitchFamily="49" charset="0"/>
+              </a:endParaRPr>
+            </a:p>
+            <a:p>
+              <a:r>
+                <a:rPr lang="pt-BR" dirty="0">
+                  <a:latin typeface="Consolas" panose="020B0609020204030204" pitchFamily="49" charset="0"/>
+                  <a:cs typeface="Consolas" panose="020B0609020204030204" pitchFamily="49" charset="0"/>
+                </a:rPr>
+                <a:t>    pxl[0</a:t>
+              </a:r>
+              <a:r>
+                <a:rPr lang="pt-BR" dirty="0" smtClean="0">
+                  <a:latin typeface="Consolas" panose="020B0609020204030204" pitchFamily="49" charset="0"/>
+                  <a:cs typeface="Consolas" panose="020B0609020204030204" pitchFamily="49" charset="0"/>
+                </a:rPr>
+                <a:t>]=...; </a:t>
+              </a:r>
+              <a:r>
+                <a:rPr lang="pt-BR" dirty="0">
+                  <a:latin typeface="Consolas" panose="020B0609020204030204" pitchFamily="49" charset="0"/>
+                  <a:cs typeface="Consolas" panose="020B0609020204030204" pitchFamily="49" charset="0"/>
+                </a:rPr>
+                <a:t>pxl[1</a:t>
+              </a:r>
+              <a:r>
+                <a:rPr lang="pt-BR" dirty="0" smtClean="0">
+                  <a:latin typeface="Consolas" panose="020B0609020204030204" pitchFamily="49" charset="0"/>
+                  <a:cs typeface="Consolas" panose="020B0609020204030204" pitchFamily="49" charset="0"/>
+                </a:rPr>
+                <a:t>]=...;	</a:t>
+              </a:r>
+              <a:r>
+                <a:rPr lang="pt-BR" i="1" dirty="0" smtClean="0">
+                  <a:solidFill>
+                    <a:srgbClr val="00B050"/>
+                  </a:solidFill>
+                  <a:latin typeface="Consolas" panose="020B0609020204030204" pitchFamily="49" charset="0"/>
+                  <a:cs typeface="Consolas" panose="020B0609020204030204" pitchFamily="49" charset="0"/>
+                </a:rPr>
+                <a:t>// retrieve data from vision</a:t>
+              </a:r>
+              <a:endParaRPr lang="pt-BR" i="1" dirty="0">
+                <a:solidFill>
+                  <a:srgbClr val="00B050"/>
+                </a:solidFill>
+                <a:latin typeface="Consolas" panose="020B0609020204030204" pitchFamily="49" charset="0"/>
+                <a:cs typeface="Consolas" panose="020B0609020204030204" pitchFamily="49" charset="0"/>
+              </a:endParaRPr>
+            </a:p>
+            <a:p>
+              <a:r>
+                <a:rPr lang="pt-BR" dirty="0">
+                  <a:latin typeface="Consolas" panose="020B0609020204030204" pitchFamily="49" charset="0"/>
+                  <a:cs typeface="Consolas" panose="020B0609020204030204" pitchFamily="49" charset="0"/>
+                </a:rPr>
+                <a:t>    pxr[0</a:t>
+              </a:r>
+              <a:r>
+                <a:rPr lang="pt-BR" dirty="0" smtClean="0">
+                  <a:latin typeface="Consolas" panose="020B0609020204030204" pitchFamily="49" charset="0"/>
+                  <a:cs typeface="Consolas" panose="020B0609020204030204" pitchFamily="49" charset="0"/>
+                </a:rPr>
+                <a:t>]=...; </a:t>
+              </a:r>
+              <a:r>
+                <a:rPr lang="pt-BR" dirty="0">
+                  <a:latin typeface="Consolas" panose="020B0609020204030204" pitchFamily="49" charset="0"/>
+                  <a:cs typeface="Consolas" panose="020B0609020204030204" pitchFamily="49" charset="0"/>
+                </a:rPr>
+                <a:t>pxr[1</a:t>
+              </a:r>
+              <a:r>
+                <a:rPr lang="pt-BR" dirty="0" smtClean="0">
+                  <a:latin typeface="Consolas" panose="020B0609020204030204" pitchFamily="49" charset="0"/>
+                  <a:cs typeface="Consolas" panose="020B0609020204030204" pitchFamily="49" charset="0"/>
+                </a:rPr>
+                <a:t>]=...;</a:t>
+              </a:r>
+            </a:p>
+            <a:p>
+              <a:endParaRPr lang="pt-BR" dirty="0">
+                <a:latin typeface="Consolas" panose="020B0609020204030204" pitchFamily="49" charset="0"/>
+                <a:cs typeface="Consolas" panose="020B0609020204030204" pitchFamily="49" charset="0"/>
+              </a:endParaRPr>
+            </a:p>
+            <a:p>
+              <a:r>
+                <a:rPr lang="pt-BR" dirty="0">
+                  <a:latin typeface="Consolas" panose="020B0609020204030204" pitchFamily="49" charset="0"/>
+                  <a:cs typeface="Consolas" panose="020B0609020204030204" pitchFamily="49" charset="0"/>
+                </a:rPr>
+                <a:t>    igaze-&gt;</a:t>
+              </a:r>
+              <a:r>
+                <a:rPr lang="pt-BR" b="1" dirty="0">
+                  <a:latin typeface="Consolas" panose="020B0609020204030204" pitchFamily="49" charset="0"/>
+                  <a:cs typeface="Consolas" panose="020B0609020204030204" pitchFamily="49" charset="0"/>
+                </a:rPr>
+                <a:t>lookAtStereoPixels</a:t>
+              </a:r>
+              <a:r>
+                <a:rPr lang="pt-BR" dirty="0">
+                  <a:latin typeface="Consolas" panose="020B0609020204030204" pitchFamily="49" charset="0"/>
+                  <a:cs typeface="Consolas" panose="020B0609020204030204" pitchFamily="49" charset="0"/>
+                </a:rPr>
+                <a:t>(pxl,pxr</a:t>
+              </a:r>
+              <a:r>
+                <a:rPr lang="pt-BR" dirty="0" smtClean="0">
+                  <a:latin typeface="Consolas" panose="020B0609020204030204" pitchFamily="49" charset="0"/>
+                  <a:cs typeface="Consolas" panose="020B0609020204030204" pitchFamily="49" charset="0"/>
+                </a:rPr>
+                <a:t>);</a:t>
+              </a:r>
+              <a:endParaRPr lang="pt-BR" dirty="0">
+                <a:latin typeface="Consolas" panose="020B0609020204030204" pitchFamily="49" charset="0"/>
+                <a:cs typeface="Consolas" panose="020B0609020204030204" pitchFamily="49" charset="0"/>
+              </a:endParaRPr>
+            </a:p>
+            <a:p>
+              <a:r>
+                <a:rPr lang="pt-BR" dirty="0">
+                  <a:latin typeface="Consolas" panose="020B0609020204030204" pitchFamily="49" charset="0"/>
+                  <a:cs typeface="Consolas" panose="020B0609020204030204" pitchFamily="49" charset="0"/>
+                </a:rPr>
+                <a:t>    converged=(0.5*(norm(c-pxl)+norm(c-pxr))&lt;5</a:t>
+              </a:r>
+              <a:r>
+                <a:rPr lang="pt-BR" dirty="0" smtClean="0">
+                  <a:latin typeface="Consolas" panose="020B0609020204030204" pitchFamily="49" charset="0"/>
+                  <a:cs typeface="Consolas" panose="020B0609020204030204" pitchFamily="49" charset="0"/>
+                </a:rPr>
+                <a:t>);</a:t>
+              </a:r>
+              <a:endParaRPr lang="pt-BR" dirty="0">
+                <a:latin typeface="Consolas" panose="020B0609020204030204" pitchFamily="49" charset="0"/>
+                <a:cs typeface="Consolas" panose="020B0609020204030204" pitchFamily="49" charset="0"/>
+              </a:endParaRPr>
+            </a:p>
+            <a:p>
+              <a:r>
+                <a:rPr lang="pt-BR" dirty="0">
+                  <a:latin typeface="Consolas" panose="020B0609020204030204" pitchFamily="49" charset="0"/>
+                  <a:cs typeface="Consolas" panose="020B0609020204030204" pitchFamily="49" charset="0"/>
+                </a:rPr>
+                <a:t>}</a:t>
+              </a:r>
+              <a:endParaRPr lang="pt-BR" dirty="0" smtClean="0">
+                <a:latin typeface="Consolas" panose="020B0609020204030204" pitchFamily="49" charset="0"/>
+                <a:cs typeface="Consolas" panose="020B0609020204030204" pitchFamily="49" charset="0"/>
+              </a:endParaRPr>
+            </a:p>
+          </p:txBody>
+        </p:sp>
+        <p:sp>
+          <p:nvSpPr>
+            <p:cNvPr id="15" name="TextBox 14"/>
+            <p:cNvSpPr txBox="1"/>
+            <p:nvPr/>
+          </p:nvSpPr>
+          <p:spPr>
+            <a:xfrm>
+              <a:off x="508725" y="1174123"/>
+              <a:ext cx="6032357" cy="400110"/>
+            </a:xfrm>
+            <a:prstGeom prst="rect">
+              <a:avLst/>
+            </a:prstGeom>
+            <a:noFill/>
+          </p:spPr>
+          <p:txBody>
+            <a:bodyPr wrap="none" rtlCol="0">
+              <a:spAutoFit/>
+            </a:bodyPr>
+            <a:lstStyle/>
+            <a:p>
+              <a:r>
+                <a:rPr lang="en-GB" sz="2000" b="1" dirty="0" smtClean="0"/>
+                <a:t>LOOK AT POINT WITH STEREO APPROACH =&gt; LOOPING!</a:t>
+              </a:r>
+              <a:endParaRPr lang="en-GB" sz="2000" b="1" dirty="0"/>
+            </a:p>
+          </p:txBody>
+        </p:sp>
+      </p:grpSp>
+    </p:spTree>
+    <p:extLst>
+      <p:ext uri="{BB962C8B-B14F-4D97-AF65-F5344CB8AC3E}">
+        <p14:creationId xmlns:p14="http://schemas.microsoft.com/office/powerpoint/2010/main" val="3874616250"/>
+      </p:ext>
+    </p:extLst>
+  </p:cSld>
+  <p:clrMapOvr>
+    <a:masterClrMapping/>
+  </p:clrMapOvr>
+  <p:timing>
+    <p:tnLst>
+      <p:par>
+        <p:cTn id="1" dur="indefinite" restart="never" nodeType="tmRoot"/>
+      </p:par>
+    </p:tnLst>
+  </p:timing>
+</p:sld>
+</file>
+
+<file path=ppt/slides/slide3.xml><?xml version="1.0" encoding="utf-8"?>
+<p:sld xmlns:a="http://schemas.openxmlformats.org/drawingml/2006/main" xmlns:r="http://schemas.openxmlformats.org/officeDocument/2006/relationships" xmlns:p="http://schemas.openxmlformats.org/presentationml/2006/main">
+  <p:cSld>
+    <p:spTree>
+      <p:nvGrpSpPr>
+        <p:cNvPr id="1" name=""/>
+        <p:cNvGrpSpPr/>
+        <p:nvPr/>
+      </p:nvGrpSpPr>
+      <p:grpSpPr>
+        <a:xfrm>
+          <a:off x="0" y="0"/>
+          <a:ext cx="0" cy="0"/>
+          <a:chOff x="0" y="0"/>
+          <a:chExt cx="0" cy="0"/>
+        </a:xfrm>
+      </p:grpSpPr>
+      <p:sp>
+        <p:nvSpPr>
+          <p:cNvPr id="2" name="TextBox 1"/>
+          <p:cNvSpPr txBox="1"/>
+          <p:nvPr/>
+        </p:nvSpPr>
+        <p:spPr>
+          <a:xfrm>
+            <a:off x="1835696" y="457508"/>
+            <a:ext cx="5688632" cy="523220"/>
+          </a:xfrm>
+          <a:prstGeom prst="rect">
+            <a:avLst/>
+          </a:prstGeom>
+          <a:noFill/>
+        </p:spPr>
+        <p:txBody>
+          <a:bodyPr wrap="square" rtlCol="0">
+            <a:spAutoFit/>
+          </a:bodyPr>
+          <a:lstStyle/>
+          <a:p>
+            <a:pPr algn="ctr"/>
+            <a:r>
+              <a:rPr lang="en-US" sz="2800" b="1" dirty="0" smtClean="0">
+                <a:latin typeface="+mj-lt"/>
+              </a:rPr>
+              <a:t>The Problem</a:t>
+            </a:r>
+            <a:endParaRPr lang="en-US" sz="2800" b="1" dirty="0">
+              <a:latin typeface="+mj-lt"/>
+            </a:endParaRPr>
+          </a:p>
+        </p:txBody>
+      </p:sp>
+      <p:pic>
+        <p:nvPicPr>
+          <p:cNvPr id="5" name="Picture 4" descr="left_hand.emf"/>
+          <p:cNvPicPr/>
+          <p:nvPr/>
+        </p:nvPicPr>
+        <p:blipFill>
+          <a:blip r:embed="rId3" cstate="print"/>
+          <a:stretch>
+            <a:fillRect/>
+          </a:stretch>
+        </p:blipFill>
+        <p:spPr>
+          <a:xfrm>
+            <a:off x="1259632" y="1412776"/>
+            <a:ext cx="6696744" cy="4464496"/>
+          </a:xfrm>
+          <a:prstGeom prst="rect">
+            <a:avLst/>
+          </a:prstGeom>
+          <a:ln>
+            <a:noFill/>
+          </a:ln>
+          <a:effectLst>
+            <a:glow rad="228600">
+              <a:schemeClr val="accent1">
+                <a:satMod val="175000"/>
+                <a:alpha val="40000"/>
+              </a:schemeClr>
+            </a:glow>
+            <a:outerShdw blurRad="63500" sx="105000" sy="105000" algn="ctr" rotWithShape="0">
+              <a:schemeClr val="accent1">
+                <a:alpha val="40000"/>
+              </a:schemeClr>
+            </a:outerShdw>
+          </a:effectLst>
+        </p:spPr>
+      </p:pic>
+    </p:spTree>
+  </p:cSld>
+  <p:clrMapOvr>
+    <a:masterClrMapping/>
+  </p:clrMapOvr>
+  <p:timing>
+    <p:tnLst>
+      <p:par>
+        <p:cTn id="1" dur="indefinite" restart="never" nodeType="tmRoot"/>
+      </p:par>
+    </p:tnLst>
+  </p:timing>
+</p:sld>
+</file>
+
+<file path=ppt/slides/slide30.xml><?xml version="1.0" encoding="utf-8"?>
+<p:sld xmlns:a="http://schemas.openxmlformats.org/drawingml/2006/main" xmlns:r="http://schemas.openxmlformats.org/officeDocument/2006/relationships" xmlns:p="http://schemas.openxmlformats.org/presentationml/2006/main">
+  <p:cSld>
+    <p:spTree>
+      <p:nvGrpSpPr>
+        <p:cNvPr id="1" name=""/>
+        <p:cNvGrpSpPr/>
+        <p:nvPr/>
+      </p:nvGrpSpPr>
+      <p:grpSpPr>
+        <a:xfrm>
+          <a:off x="0" y="0"/>
+          <a:ext cx="0" cy="0"/>
+          <a:chOff x="0" y="0"/>
+          <a:chExt cx="0" cy="0"/>
+        </a:xfrm>
+      </p:grpSpPr>
+      <p:sp>
+        <p:nvSpPr>
+          <p:cNvPr id="7" name="TextBox 6"/>
+          <p:cNvSpPr txBox="1"/>
+          <p:nvPr/>
+        </p:nvSpPr>
+        <p:spPr>
+          <a:xfrm>
+            <a:off x="1475656" y="457508"/>
+            <a:ext cx="6480720" cy="523220"/>
+          </a:xfrm>
+          <a:prstGeom prst="rect">
+            <a:avLst/>
+          </a:prstGeom>
+          <a:noFill/>
+        </p:spPr>
+        <p:txBody>
+          <a:bodyPr wrap="square" rtlCol="0">
+            <a:spAutoFit/>
+          </a:bodyPr>
+          <a:lstStyle/>
+          <a:p>
+            <a:pPr algn="ctr"/>
+            <a:r>
+              <a:rPr lang="en-US" sz="2800" b="1" dirty="0" smtClean="0"/>
+              <a:t>Gaze</a:t>
+            </a:r>
+            <a:r>
+              <a:rPr lang="en-US" sz="2800" b="1" dirty="0"/>
+              <a:t> Interface </a:t>
+            </a:r>
+            <a:r>
+              <a:rPr lang="en-US" sz="2800" b="1" dirty="0" smtClean="0"/>
+              <a:t>(</a:t>
+            </a:r>
+            <a:r>
+              <a:rPr lang="en-US" sz="2800" b="1" dirty="0"/>
+              <a:t>6</a:t>
+            </a:r>
+            <a:r>
+              <a:rPr lang="en-US" sz="2800" b="1" dirty="0" smtClean="0"/>
+              <a:t>/6)</a:t>
+            </a:r>
+            <a:endParaRPr lang="en-US" sz="2800" b="1" dirty="0"/>
           </a:p>
         </p:txBody>
       </p:sp>
@@ -12500,7 +13186,7 @@
 </p:sld>
 </file>
 
-<file path=ppt/slides/slide29.xml><?xml version="1.0" encoding="utf-8"?>
+<file path=ppt/slides/slide31.xml><?xml version="1.0" encoding="utf-8"?>
 <p:sld xmlns:a="http://schemas.openxmlformats.org/drawingml/2006/main" xmlns:r="http://schemas.openxmlformats.org/officeDocument/2006/relationships" xmlns:p="http://schemas.openxmlformats.org/presentationml/2006/main">
   <p:cSld>
     <p:spTree>
@@ -13255,111 +13941,6 @@
 </p:sld>
 </file>
 
-<file path=ppt/slides/slide3.xml><?xml version="1.0" encoding="utf-8"?>
-<p:sld xmlns:a="http://schemas.openxmlformats.org/drawingml/2006/main" xmlns:r="http://schemas.openxmlformats.org/officeDocument/2006/relationships" xmlns:p="http://schemas.openxmlformats.org/presentationml/2006/main">
-  <p:cSld>
-    <p:spTree>
-      <p:nvGrpSpPr>
-        <p:cNvPr id="1" name=""/>
-        <p:cNvGrpSpPr/>
-        <p:nvPr/>
-      </p:nvGrpSpPr>
-      <p:grpSpPr>
-        <a:xfrm>
-          <a:off x="0" y="0"/>
-          <a:ext cx="0" cy="0"/>
-          <a:chOff x="0" y="0"/>
-          <a:chExt cx="0" cy="0"/>
-        </a:xfrm>
-      </p:grpSpPr>
-      <p:sp>
-        <p:nvSpPr>
-          <p:cNvPr id="2" name="TextBox 1"/>
-          <p:cNvSpPr txBox="1"/>
-          <p:nvPr/>
-        </p:nvSpPr>
-        <p:spPr>
-          <a:xfrm>
-            <a:off x="1835696" y="457508"/>
-            <a:ext cx="5688632" cy="523220"/>
-          </a:xfrm>
-          <a:prstGeom prst="rect">
-            <a:avLst/>
-          </a:prstGeom>
-          <a:noFill/>
-        </p:spPr>
-        <p:txBody>
-          <a:bodyPr wrap="square" rtlCol="0">
-            <a:spAutoFit/>
-          </a:bodyPr>
-          <a:lstStyle/>
-          <a:p>
-            <a:pPr algn="ctr"/>
-            <a:r>
-              <a:rPr lang="en-US" sz="2800" b="1" dirty="0" smtClean="0">
-                <a:latin typeface="+mj-lt"/>
-              </a:rPr>
-              <a:t>The Problem</a:t>
-            </a:r>
-            <a:endParaRPr lang="en-US" sz="2800" b="1" dirty="0">
-              <a:latin typeface="+mj-lt"/>
-            </a:endParaRPr>
-          </a:p>
-        </p:txBody>
-      </p:sp>
-      <p:pic>
-        <p:nvPicPr>
-          <p:cNvPr id="5" name="Picture 4" descr="left_hand.emf"/>
-          <p:cNvPicPr/>
-          <p:nvPr/>
-        </p:nvPicPr>
-        <p:blipFill>
-          <a:blip r:embed="rId3" cstate="print"/>
-          <a:stretch>
-            <a:fillRect/>
-          </a:stretch>
-        </p:blipFill>
-        <p:spPr>
-          <a:xfrm>
-            <a:off x="1259632" y="1412776"/>
-            <a:ext cx="6696744" cy="4464496"/>
-          </a:xfrm>
-          <a:prstGeom prst="rect">
-            <a:avLst/>
-          </a:prstGeom>
-          <a:ln>
-            <a:noFill/>
-          </a:ln>
-          <a:effectLst>
-            <a:glow rad="228600">
-              <a:schemeClr val="accent1">
-                <a:satMod val="175000"/>
-                <a:alpha val="40000"/>
-              </a:schemeClr>
-            </a:glow>
-            <a:outerShdw blurRad="63500" sx="105000" sy="105000" algn="ctr" rotWithShape="0">
-              <a:schemeClr val="accent1">
-                <a:alpha val="40000"/>
-              </a:schemeClr>
-            </a:outerShdw>
-          </a:effectLst>
-        </p:spPr>
-      </p:pic>
-    </p:spTree>
-  </p:cSld>
-  <p:clrMapOvr>
-    <a:masterClrMapping/>
-  </p:clrMapOvr>
-  <p:timing>
-    <p:tnLst>
-      <p:par>
-        <p:cTn id="1" dur="indefinite" restart="never" nodeType="tmRoot"/>
-      </p:par>
-    </p:tnLst>
-  </p:timing>
-</p:sld>
-</file>
-
 <file path=ppt/slides/slide4.xml><?xml version="1.0" encoding="utf-8"?>
 <p:sld xmlns:a="http://schemas.openxmlformats.org/drawingml/2006/main" xmlns:r="http://schemas.openxmlformats.org/officeDocument/2006/relationships" xmlns:p="http://schemas.openxmlformats.org/presentationml/2006/main">
   <p:cSld>
@@ -13474,13 +14055,7 @@
               <a:rPr lang="en-US" sz="2800" b="1" dirty="0" smtClean="0">
                 <a:latin typeface="+mj-lt"/>
               </a:rPr>
-              <a:t>The Cartesian Controller (</a:t>
-            </a:r>
-            <a:r>
-              <a:rPr lang="en-US" sz="2800" b="1" dirty="0" smtClean="0">
-                <a:latin typeface="+mj-lt"/>
-              </a:rPr>
-              <a:t>1/6)</a:t>
+              <a:t>The Cartesian Controller (1/6)</a:t>
             </a:r>
             <a:endParaRPr lang="en-US" sz="2800" b="1" dirty="0">
               <a:latin typeface="+mj-lt"/>
@@ -13582,7 +14157,7 @@
           <a:graphicData uri="http://schemas.openxmlformats.org/presentationml/2006/ole">
             <mc:AlternateContent xmlns:mc="http://schemas.openxmlformats.org/markup-compatibility/2006">
               <mc:Choice xmlns:v="urn:schemas-microsoft-com:vml" Requires="v">
-                <p:oleObj spid="_x0000_s1074" name="Equation" r:id="rId4" imgW="3187440" imgH="1104840" progId="Equation.DSMT4">
+                <p:oleObj spid="_x0000_s1076" name="Equation" r:id="rId4" imgW="3187440" imgH="1104840" progId="Equation.DSMT4">
                   <p:embed/>
                 </p:oleObj>
               </mc:Choice>
@@ -13755,13 +14330,7 @@
               <a:rPr lang="en-US" sz="2800" b="1" dirty="0" smtClean="0">
                 <a:latin typeface="+mj-lt"/>
               </a:rPr>
-              <a:t>The Cartesian Controller (</a:t>
-            </a:r>
-            <a:r>
-              <a:rPr lang="en-US" sz="2800" b="1" dirty="0" smtClean="0">
-                <a:latin typeface="+mj-lt"/>
-              </a:rPr>
-              <a:t>2/6)</a:t>
+              <a:t>The Cartesian Controller (2/6)</a:t>
             </a:r>
             <a:endParaRPr lang="en-US" sz="2800" b="1" dirty="0">
               <a:latin typeface="+mj-lt"/>
@@ -13939,13 +14508,7 @@
               <a:rPr lang="en-US" sz="2800" b="1" dirty="0" smtClean="0">
                 <a:latin typeface="+mj-lt"/>
               </a:rPr>
-              <a:t>The Cartesian Controller (</a:t>
-            </a:r>
-            <a:r>
-              <a:rPr lang="en-US" sz="2800" b="1" dirty="0" smtClean="0">
-                <a:latin typeface="+mj-lt"/>
-              </a:rPr>
-              <a:t>3/6)</a:t>
+              <a:t>The Cartesian Controller (3/6)</a:t>
             </a:r>
             <a:endParaRPr lang="en-US" sz="2800" b="1" dirty="0">
               <a:latin typeface="+mj-lt"/>
@@ -14194,13 +14757,7 @@
               <a:rPr lang="en-US" sz="2800" b="1" dirty="0" smtClean="0">
                 <a:latin typeface="+mj-lt"/>
               </a:rPr>
-              <a:t>The Cartesian Controller (</a:t>
-            </a:r>
-            <a:r>
-              <a:rPr lang="en-US" sz="2800" b="1" dirty="0" smtClean="0">
-                <a:latin typeface="+mj-lt"/>
-              </a:rPr>
-              <a:t>4/6)</a:t>
+              <a:t>The Cartesian Controller (4/6)</a:t>
             </a:r>
             <a:endParaRPr lang="en-US" sz="2800" b="1" dirty="0">
               <a:latin typeface="+mj-lt"/>
@@ -14827,13 +15384,7 @@
               <a:rPr lang="en-US" sz="2800" b="1" dirty="0" smtClean="0">
                 <a:latin typeface="+mj-lt"/>
               </a:rPr>
-              <a:t>The Cartesian Controller (</a:t>
-            </a:r>
-            <a:r>
-              <a:rPr lang="en-US" sz="2800" b="1" dirty="0" smtClean="0">
-                <a:latin typeface="+mj-lt"/>
-              </a:rPr>
-              <a:t>5/6)</a:t>
+              <a:t>The Cartesian Controller (5/6)</a:t>
             </a:r>
             <a:endParaRPr lang="en-US" sz="2800" b="1" dirty="0">
               <a:latin typeface="+mj-lt"/>
@@ -14933,13 +15484,7 @@
               <a:rPr lang="en-US" sz="2800" b="1" dirty="0" smtClean="0">
                 <a:latin typeface="+mj-lt"/>
               </a:rPr>
-              <a:t>The Cartesian Controller </a:t>
-            </a:r>
-            <a:r>
-              <a:rPr lang="en-US" sz="2800" b="1" dirty="0" smtClean="0">
-                <a:latin typeface="+mj-lt"/>
-              </a:rPr>
-              <a:t>(</a:t>
+              <a:t>The Cartesian Controller (</a:t>
             </a:r>
             <a:r>
               <a:rPr lang="en-US" sz="2800" b="1" dirty="0">

</xml_diff>